<commit_message>
Created the full powerpoint presentation for the F# part
</commit_message>
<xml_diff>
--- a/F#Presentation.pptx
+++ b/F#Presentation.pptx
@@ -6,6 +6,7 @@
   </p:sldMasterIdLst>
   <p:sldIdLst>
     <p:sldId id="256" r:id="rId2"/>
+    <p:sldId id="257" r:id="rId3"/>
   </p:sldIdLst>
   <p:sldSz cx="12192000" cy="6858000"/>
   <p:notesSz cx="6858000" cy="9144000"/>
@@ -104,6 +105,11 @@
       </a:defRPr>
     </a:lvl9pPr>
   </p:defaultTextStyle>
+  <p:extLst>
+    <p:ext uri="{EFAFB233-063F-42B5-8137-9DF3F51BA10A}">
+      <p15:sldGuideLst xmlns:p15="http://schemas.microsoft.com/office/powerpoint/2012/main"/>
+    </p:ext>
+  </p:extLst>
 </p:presentation>
 </file>
 
@@ -238,7 +244,7 @@
           <a:p>
             <a:fld id="{BCAC8651-F919-45BD-B9AA-B06CF5EE0DFC}" type="datetimeFigureOut">
               <a:rPr lang="en-GB" smtClean="0"/>
-              <a:t>31/07/2015</a:t>
+              <a:t>03/08/2015</a:t>
             </a:fld>
             <a:endParaRPr lang="en-GB"/>
           </a:p>
@@ -408,7 +414,7 @@
           <a:p>
             <a:fld id="{BCAC8651-F919-45BD-B9AA-B06CF5EE0DFC}" type="datetimeFigureOut">
               <a:rPr lang="en-GB" smtClean="0"/>
-              <a:t>31/07/2015</a:t>
+              <a:t>03/08/2015</a:t>
             </a:fld>
             <a:endParaRPr lang="en-GB"/>
           </a:p>
@@ -588,7 +594,7 @@
           <a:p>
             <a:fld id="{BCAC8651-F919-45BD-B9AA-B06CF5EE0DFC}" type="datetimeFigureOut">
               <a:rPr lang="en-GB" smtClean="0"/>
-              <a:t>31/07/2015</a:t>
+              <a:t>03/08/2015</a:t>
             </a:fld>
             <a:endParaRPr lang="en-GB"/>
           </a:p>
@@ -758,7 +764,7 @@
           <a:p>
             <a:fld id="{BCAC8651-F919-45BD-B9AA-B06CF5EE0DFC}" type="datetimeFigureOut">
               <a:rPr lang="en-GB" smtClean="0"/>
-              <a:t>31/07/2015</a:t>
+              <a:t>03/08/2015</a:t>
             </a:fld>
             <a:endParaRPr lang="en-GB"/>
           </a:p>
@@ -1004,7 +1010,7 @@
           <a:p>
             <a:fld id="{BCAC8651-F919-45BD-B9AA-B06CF5EE0DFC}" type="datetimeFigureOut">
               <a:rPr lang="en-GB" smtClean="0"/>
-              <a:t>31/07/2015</a:t>
+              <a:t>03/08/2015</a:t>
             </a:fld>
             <a:endParaRPr lang="en-GB"/>
           </a:p>
@@ -1236,7 +1242,7 @@
           <a:p>
             <a:fld id="{BCAC8651-F919-45BD-B9AA-B06CF5EE0DFC}" type="datetimeFigureOut">
               <a:rPr lang="en-GB" smtClean="0"/>
-              <a:t>31/07/2015</a:t>
+              <a:t>03/08/2015</a:t>
             </a:fld>
             <a:endParaRPr lang="en-GB"/>
           </a:p>
@@ -1603,7 +1609,7 @@
           <a:p>
             <a:fld id="{BCAC8651-F919-45BD-B9AA-B06CF5EE0DFC}" type="datetimeFigureOut">
               <a:rPr lang="en-GB" smtClean="0"/>
-              <a:t>31/07/2015</a:t>
+              <a:t>03/08/2015</a:t>
             </a:fld>
             <a:endParaRPr lang="en-GB"/>
           </a:p>
@@ -1721,7 +1727,7 @@
           <a:p>
             <a:fld id="{BCAC8651-F919-45BD-B9AA-B06CF5EE0DFC}" type="datetimeFigureOut">
               <a:rPr lang="en-GB" smtClean="0"/>
-              <a:t>31/07/2015</a:t>
+              <a:t>03/08/2015</a:t>
             </a:fld>
             <a:endParaRPr lang="en-GB"/>
           </a:p>
@@ -1816,7 +1822,7 @@
           <a:p>
             <a:fld id="{BCAC8651-F919-45BD-B9AA-B06CF5EE0DFC}" type="datetimeFigureOut">
               <a:rPr lang="en-GB" smtClean="0"/>
-              <a:t>31/07/2015</a:t>
+              <a:t>03/08/2015</a:t>
             </a:fld>
             <a:endParaRPr lang="en-GB"/>
           </a:p>
@@ -2093,7 +2099,7 @@
           <a:p>
             <a:fld id="{BCAC8651-F919-45BD-B9AA-B06CF5EE0DFC}" type="datetimeFigureOut">
               <a:rPr lang="en-GB" smtClean="0"/>
-              <a:t>31/07/2015</a:t>
+              <a:t>03/08/2015</a:t>
             </a:fld>
             <a:endParaRPr lang="en-GB"/>
           </a:p>
@@ -2346,7 +2352,7 @@
           <a:p>
             <a:fld id="{BCAC8651-F919-45BD-B9AA-B06CF5EE0DFC}" type="datetimeFigureOut">
               <a:rPr lang="en-GB" smtClean="0"/>
-              <a:t>31/07/2015</a:t>
+              <a:t>03/08/2015</a:t>
             </a:fld>
             <a:endParaRPr lang="en-GB"/>
           </a:p>
@@ -2559,7 +2565,7 @@
           <a:p>
             <a:fld id="{BCAC8651-F919-45BD-B9AA-B06CF5EE0DFC}" type="datetimeFigureOut">
               <a:rPr lang="en-GB" smtClean="0"/>
-              <a:t>31/07/2015</a:t>
+              <a:t>03/08/2015</a:t>
             </a:fld>
             <a:endParaRPr lang="en-GB"/>
           </a:p>
@@ -2986,14 +2992,704 @@
         </p:blipFill>
         <p:spPr>
           <a:xfrm>
-            <a:off x="0" y="227859"/>
-            <a:ext cx="10058400" cy="5281882"/>
+            <a:off x="2825578" y="1685956"/>
+            <a:ext cx="5832390" cy="3062713"/>
           </a:xfrm>
           <a:prstGeom prst="rect">
             <a:avLst/>
           </a:prstGeom>
         </p:spPr>
       </p:pic>
+      <p:sp>
+        <p:nvSpPr>
+          <p:cNvPr id="2" name="TextBox 1"/>
+          <p:cNvSpPr txBox="1"/>
+          <p:nvPr/>
+        </p:nvSpPr>
+        <p:spPr>
+          <a:xfrm>
+            <a:off x="2464169" y="845749"/>
+            <a:ext cx="1529650" cy="369332"/>
+          </a:xfrm>
+          <a:prstGeom prst="rect">
+            <a:avLst/>
+          </a:prstGeom>
+          <a:noFill/>
+        </p:spPr>
+        <p:txBody>
+          <a:bodyPr wrap="none" rtlCol="0">
+            <a:spAutoFit/>
+          </a:bodyPr>
+          <a:lstStyle/>
+          <a:p>
+            <a:r>
+              <a:rPr lang="en-GB" dirty="0" err="1" smtClean="0"/>
+              <a:t>.Net</a:t>
+            </a:r>
+            <a:r>
+              <a:rPr lang="en-GB" dirty="0" smtClean="0"/>
+              <a:t> Language</a:t>
+            </a:r>
+            <a:endParaRPr lang="en-GB" dirty="0"/>
+          </a:p>
+        </p:txBody>
+      </p:sp>
+      <p:sp>
+        <p:nvSpPr>
+          <p:cNvPr id="4" name="TextBox 3"/>
+          <p:cNvSpPr txBox="1"/>
+          <p:nvPr/>
+        </p:nvSpPr>
+        <p:spPr>
+          <a:xfrm>
+            <a:off x="4925644" y="845749"/>
+            <a:ext cx="1630639" cy="369332"/>
+          </a:xfrm>
+          <a:prstGeom prst="rect">
+            <a:avLst/>
+          </a:prstGeom>
+          <a:noFill/>
+        </p:spPr>
+        <p:txBody>
+          <a:bodyPr wrap="none" rtlCol="0">
+            <a:spAutoFit/>
+          </a:bodyPr>
+          <a:lstStyle/>
+          <a:p>
+            <a:r>
+              <a:rPr lang="en-GB" dirty="0" err="1" smtClean="0"/>
+              <a:t>Multiparadigm</a:t>
+            </a:r>
+            <a:endParaRPr lang="en-GB" dirty="0"/>
+          </a:p>
+        </p:txBody>
+      </p:sp>
+      <p:sp>
+        <p:nvSpPr>
+          <p:cNvPr id="5" name="TextBox 4"/>
+          <p:cNvSpPr txBox="1"/>
+          <p:nvPr/>
+        </p:nvSpPr>
+        <p:spPr>
+          <a:xfrm>
+            <a:off x="7537452" y="844730"/>
+            <a:ext cx="1168910" cy="369332"/>
+          </a:xfrm>
+          <a:prstGeom prst="rect">
+            <a:avLst/>
+          </a:prstGeom>
+          <a:noFill/>
+        </p:spPr>
+        <p:txBody>
+          <a:bodyPr wrap="none" rtlCol="0">
+            <a:spAutoFit/>
+          </a:bodyPr>
+          <a:lstStyle/>
+          <a:p>
+            <a:r>
+              <a:rPr lang="en-GB" dirty="0" smtClean="0"/>
+              <a:t>Functional</a:t>
+            </a:r>
+            <a:endParaRPr lang="en-GB" dirty="0"/>
+          </a:p>
+        </p:txBody>
+      </p:sp>
+      <p:sp>
+        <p:nvSpPr>
+          <p:cNvPr id="7" name="TextBox 6"/>
+          <p:cNvSpPr txBox="1"/>
+          <p:nvPr/>
+        </p:nvSpPr>
+        <p:spPr>
+          <a:xfrm>
+            <a:off x="7537452" y="2515795"/>
+            <a:ext cx="1611531" cy="369332"/>
+          </a:xfrm>
+          <a:prstGeom prst="rect">
+            <a:avLst/>
+          </a:prstGeom>
+          <a:noFill/>
+        </p:spPr>
+        <p:txBody>
+          <a:bodyPr wrap="none" rtlCol="0">
+            <a:spAutoFit/>
+          </a:bodyPr>
+          <a:lstStyle/>
+          <a:p>
+            <a:r>
+              <a:rPr lang="en-GB" dirty="0" smtClean="0"/>
+              <a:t>What, not How</a:t>
+            </a:r>
+            <a:endParaRPr lang="en-GB" dirty="0"/>
+          </a:p>
+        </p:txBody>
+      </p:sp>
+      <p:sp>
+        <p:nvSpPr>
+          <p:cNvPr id="8" name="TextBox 7"/>
+          <p:cNvSpPr txBox="1"/>
+          <p:nvPr/>
+        </p:nvSpPr>
+        <p:spPr>
+          <a:xfrm>
+            <a:off x="7537452" y="3714966"/>
+            <a:ext cx="1308371" cy="369332"/>
+          </a:xfrm>
+          <a:prstGeom prst="rect">
+            <a:avLst/>
+          </a:prstGeom>
+          <a:noFill/>
+        </p:spPr>
+        <p:txBody>
+          <a:bodyPr wrap="none" rtlCol="0">
+            <a:spAutoFit/>
+          </a:bodyPr>
+          <a:lstStyle/>
+          <a:p>
+            <a:r>
+              <a:rPr lang="en-GB" dirty="0" err="1" smtClean="0"/>
+              <a:t>OCaml</a:t>
+            </a:r>
+            <a:r>
+              <a:rPr lang="en-GB" dirty="0" smtClean="0"/>
+              <a:t> child</a:t>
+            </a:r>
+            <a:endParaRPr lang="en-GB" dirty="0"/>
+          </a:p>
+        </p:txBody>
+      </p:sp>
+      <p:sp>
+        <p:nvSpPr>
+          <p:cNvPr id="9" name="TextBox 8"/>
+          <p:cNvSpPr txBox="1"/>
+          <p:nvPr/>
+        </p:nvSpPr>
+        <p:spPr>
+          <a:xfrm>
+            <a:off x="7537452" y="5235686"/>
+            <a:ext cx="1379288" cy="369332"/>
+          </a:xfrm>
+          <a:prstGeom prst="rect">
+            <a:avLst/>
+          </a:prstGeom>
+          <a:noFill/>
+        </p:spPr>
+        <p:txBody>
+          <a:bodyPr wrap="none" rtlCol="0">
+            <a:spAutoFit/>
+          </a:bodyPr>
+          <a:lstStyle/>
+          <a:p>
+            <a:r>
+              <a:rPr lang="en-GB" dirty="0" smtClean="0"/>
+              <a:t>Immutability</a:t>
+            </a:r>
+            <a:endParaRPr lang="en-GB" dirty="0"/>
+          </a:p>
+        </p:txBody>
+      </p:sp>
+      <p:sp>
+        <p:nvSpPr>
+          <p:cNvPr id="10" name="TextBox 9"/>
+          <p:cNvSpPr txBox="1"/>
+          <p:nvPr/>
+        </p:nvSpPr>
+        <p:spPr>
+          <a:xfrm>
+            <a:off x="5390610" y="5235686"/>
+            <a:ext cx="700705" cy="369332"/>
+          </a:xfrm>
+          <a:prstGeom prst="rect">
+            <a:avLst/>
+          </a:prstGeom>
+          <a:noFill/>
+        </p:spPr>
+        <p:txBody>
+          <a:bodyPr wrap="none" rtlCol="0">
+            <a:spAutoFit/>
+          </a:bodyPr>
+          <a:lstStyle/>
+          <a:p>
+            <a:r>
+              <a:rPr lang="en-GB" dirty="0" smtClean="0"/>
+              <a:t>Static</a:t>
+            </a:r>
+          </a:p>
+        </p:txBody>
+      </p:sp>
+      <p:sp>
+        <p:nvSpPr>
+          <p:cNvPr id="11" name="TextBox 10"/>
+          <p:cNvSpPr txBox="1"/>
+          <p:nvPr/>
+        </p:nvSpPr>
+        <p:spPr>
+          <a:xfrm>
+            <a:off x="2431917" y="5235686"/>
+            <a:ext cx="1561902" cy="369332"/>
+          </a:xfrm>
+          <a:prstGeom prst="rect">
+            <a:avLst/>
+          </a:prstGeom>
+          <a:noFill/>
+        </p:spPr>
+        <p:txBody>
+          <a:bodyPr wrap="none" rtlCol="0">
+            <a:spAutoFit/>
+          </a:bodyPr>
+          <a:lstStyle/>
+          <a:p>
+            <a:r>
+              <a:rPr lang="en-GB" dirty="0" smtClean="0"/>
+              <a:t>Type inference</a:t>
+            </a:r>
+            <a:endParaRPr lang="en-GB" dirty="0"/>
+          </a:p>
+        </p:txBody>
+      </p:sp>
+      <p:sp>
+        <p:nvSpPr>
+          <p:cNvPr id="12" name="TextBox 11"/>
+          <p:cNvSpPr txBox="1"/>
+          <p:nvPr/>
+        </p:nvSpPr>
+        <p:spPr>
+          <a:xfrm>
+            <a:off x="2029179" y="3714966"/>
+            <a:ext cx="1964640" cy="369332"/>
+          </a:xfrm>
+          <a:prstGeom prst="rect">
+            <a:avLst/>
+          </a:prstGeom>
+          <a:noFill/>
+        </p:spPr>
+        <p:txBody>
+          <a:bodyPr wrap="none" rtlCol="0">
+            <a:spAutoFit/>
+          </a:bodyPr>
+          <a:lstStyle/>
+          <a:p>
+            <a:r>
+              <a:rPr lang="en-GB" dirty="0" smtClean="0"/>
+              <a:t>Indentation scopes</a:t>
+            </a:r>
+            <a:endParaRPr lang="en-GB" dirty="0"/>
+          </a:p>
+        </p:txBody>
+      </p:sp>
+      <p:sp>
+        <p:nvSpPr>
+          <p:cNvPr id="13" name="TextBox 12"/>
+          <p:cNvSpPr txBox="1"/>
+          <p:nvPr/>
+        </p:nvSpPr>
+        <p:spPr>
+          <a:xfrm>
+            <a:off x="1818608" y="2509806"/>
+            <a:ext cx="2175211" cy="369332"/>
+          </a:xfrm>
+          <a:prstGeom prst="rect">
+            <a:avLst/>
+          </a:prstGeom>
+          <a:noFill/>
+        </p:spPr>
+        <p:txBody>
+          <a:bodyPr wrap="none" rtlCol="0">
+            <a:spAutoFit/>
+          </a:bodyPr>
+          <a:lstStyle/>
+          <a:p>
+            <a:r>
+              <a:rPr lang="en-GB" dirty="0" smtClean="0"/>
+              <a:t>Order of declarations</a:t>
+            </a:r>
+            <a:endParaRPr lang="en-GB" dirty="0"/>
+          </a:p>
+        </p:txBody>
+      </p:sp>
+      <p:cxnSp>
+        <p:nvCxnSpPr>
+          <p:cNvPr id="14" name="Straight Arrow Connector 13"/>
+          <p:cNvCxnSpPr>
+            <a:endCxn id="2" idx="2"/>
+          </p:cNvCxnSpPr>
+          <p:nvPr/>
+        </p:nvCxnSpPr>
+        <p:spPr>
+          <a:xfrm flipH="1" flipV="1">
+            <a:off x="3228994" y="1215081"/>
+            <a:ext cx="1408910" cy="985377"/>
+          </a:xfrm>
+          <a:prstGeom prst="straightConnector1">
+            <a:avLst/>
+          </a:prstGeom>
+          <a:ln w="38100">
+            <a:tailEnd type="triangle"/>
+          </a:ln>
+        </p:spPr>
+        <p:style>
+          <a:lnRef idx="1">
+            <a:schemeClr val="accent1"/>
+          </a:lnRef>
+          <a:fillRef idx="0">
+            <a:schemeClr val="accent1"/>
+          </a:fillRef>
+          <a:effectRef idx="0">
+            <a:schemeClr val="accent1"/>
+          </a:effectRef>
+          <a:fontRef idx="minor">
+            <a:schemeClr val="tx1"/>
+          </a:fontRef>
+        </p:style>
+      </p:cxnSp>
+      <p:cxnSp>
+        <p:nvCxnSpPr>
+          <p:cNvPr id="15" name="Straight Arrow Connector 14"/>
+          <p:cNvCxnSpPr>
+            <a:endCxn id="4" idx="2"/>
+          </p:cNvCxnSpPr>
+          <p:nvPr/>
+        </p:nvCxnSpPr>
+        <p:spPr>
+          <a:xfrm flipH="1" flipV="1">
+            <a:off x="5740964" y="1215081"/>
+            <a:ext cx="15008" cy="910281"/>
+          </a:xfrm>
+          <a:prstGeom prst="straightConnector1">
+            <a:avLst/>
+          </a:prstGeom>
+          <a:ln w="38100">
+            <a:tailEnd type="triangle"/>
+          </a:ln>
+        </p:spPr>
+        <p:style>
+          <a:lnRef idx="1">
+            <a:schemeClr val="accent1"/>
+          </a:lnRef>
+          <a:fillRef idx="0">
+            <a:schemeClr val="accent1"/>
+          </a:fillRef>
+          <a:effectRef idx="0">
+            <a:schemeClr val="accent1"/>
+          </a:effectRef>
+          <a:fontRef idx="minor">
+            <a:schemeClr val="tx1"/>
+          </a:fontRef>
+        </p:style>
+      </p:cxnSp>
+      <p:cxnSp>
+        <p:nvCxnSpPr>
+          <p:cNvPr id="21" name="Straight Arrow Connector 20"/>
+          <p:cNvCxnSpPr/>
+          <p:nvPr/>
+        </p:nvCxnSpPr>
+        <p:spPr>
+          <a:xfrm flipH="1" flipV="1">
+            <a:off x="5725954" y="4319819"/>
+            <a:ext cx="15008" cy="910281"/>
+          </a:xfrm>
+          <a:prstGeom prst="straightConnector1">
+            <a:avLst/>
+          </a:prstGeom>
+          <a:ln w="38100">
+            <a:headEnd type="triangle" w="med" len="med"/>
+            <a:tailEnd type="none" w="med" len="med"/>
+          </a:ln>
+        </p:spPr>
+        <p:style>
+          <a:lnRef idx="1">
+            <a:schemeClr val="accent1"/>
+          </a:lnRef>
+          <a:fillRef idx="0">
+            <a:schemeClr val="accent1"/>
+          </a:fillRef>
+          <a:effectRef idx="0">
+            <a:schemeClr val="accent1"/>
+          </a:effectRef>
+          <a:fontRef idx="minor">
+            <a:schemeClr val="tx1"/>
+          </a:fontRef>
+        </p:style>
+      </p:cxnSp>
+      <p:cxnSp>
+        <p:nvCxnSpPr>
+          <p:cNvPr id="22" name="Straight Arrow Connector 21"/>
+          <p:cNvCxnSpPr>
+            <a:stCxn id="4" idx="3"/>
+            <a:endCxn id="5" idx="1"/>
+          </p:cNvCxnSpPr>
+          <p:nvPr/>
+        </p:nvCxnSpPr>
+        <p:spPr>
+          <a:xfrm flipV="1">
+            <a:off x="6556283" y="1029396"/>
+            <a:ext cx="981169" cy="1019"/>
+          </a:xfrm>
+          <a:prstGeom prst="straightConnector1">
+            <a:avLst/>
+          </a:prstGeom>
+          <a:ln w="38100">
+            <a:tailEnd type="triangle"/>
+          </a:ln>
+        </p:spPr>
+        <p:style>
+          <a:lnRef idx="1">
+            <a:schemeClr val="accent1"/>
+          </a:lnRef>
+          <a:fillRef idx="0">
+            <a:schemeClr val="accent1"/>
+          </a:fillRef>
+          <a:effectRef idx="0">
+            <a:schemeClr val="accent1"/>
+          </a:effectRef>
+          <a:fontRef idx="minor">
+            <a:schemeClr val="tx1"/>
+          </a:fontRef>
+        </p:style>
+      </p:cxnSp>
+      <p:cxnSp>
+        <p:nvCxnSpPr>
+          <p:cNvPr id="27" name="Straight Arrow Connector 26"/>
+          <p:cNvCxnSpPr/>
+          <p:nvPr/>
+        </p:nvCxnSpPr>
+        <p:spPr>
+          <a:xfrm>
+            <a:off x="6829168" y="2700461"/>
+            <a:ext cx="708284" cy="0"/>
+          </a:xfrm>
+          <a:prstGeom prst="straightConnector1">
+            <a:avLst/>
+          </a:prstGeom>
+          <a:ln w="38100">
+            <a:tailEnd type="triangle"/>
+          </a:ln>
+        </p:spPr>
+        <p:style>
+          <a:lnRef idx="1">
+            <a:schemeClr val="accent1"/>
+          </a:lnRef>
+          <a:fillRef idx="0">
+            <a:schemeClr val="accent1"/>
+          </a:fillRef>
+          <a:effectRef idx="0">
+            <a:schemeClr val="accent1"/>
+          </a:effectRef>
+          <a:fontRef idx="minor">
+            <a:schemeClr val="tx1"/>
+          </a:fontRef>
+        </p:style>
+      </p:cxnSp>
+      <p:cxnSp>
+        <p:nvCxnSpPr>
+          <p:cNvPr id="30" name="Straight Arrow Connector 29"/>
+          <p:cNvCxnSpPr/>
+          <p:nvPr/>
+        </p:nvCxnSpPr>
+        <p:spPr>
+          <a:xfrm>
+            <a:off x="6829168" y="3899632"/>
+            <a:ext cx="708284" cy="0"/>
+          </a:xfrm>
+          <a:prstGeom prst="straightConnector1">
+            <a:avLst/>
+          </a:prstGeom>
+          <a:ln w="38100">
+            <a:tailEnd type="triangle"/>
+          </a:ln>
+        </p:spPr>
+        <p:style>
+          <a:lnRef idx="1">
+            <a:schemeClr val="accent1"/>
+          </a:lnRef>
+          <a:fillRef idx="0">
+            <a:schemeClr val="accent1"/>
+          </a:fillRef>
+          <a:effectRef idx="0">
+            <a:schemeClr val="accent1"/>
+          </a:effectRef>
+          <a:fontRef idx="minor">
+            <a:schemeClr val="tx1"/>
+          </a:fontRef>
+        </p:style>
+      </p:cxnSp>
+      <p:cxnSp>
+        <p:nvCxnSpPr>
+          <p:cNvPr id="31" name="Straight Arrow Connector 30"/>
+          <p:cNvCxnSpPr/>
+          <p:nvPr/>
+        </p:nvCxnSpPr>
+        <p:spPr>
+          <a:xfrm>
+            <a:off x="3929620" y="2694792"/>
+            <a:ext cx="708284" cy="0"/>
+          </a:xfrm>
+          <a:prstGeom prst="straightConnector1">
+            <a:avLst/>
+          </a:prstGeom>
+          <a:ln w="38100">
+            <a:headEnd type="triangle" w="med" len="med"/>
+            <a:tailEnd type="none" w="med" len="med"/>
+          </a:ln>
+        </p:spPr>
+        <p:style>
+          <a:lnRef idx="1">
+            <a:schemeClr val="accent1"/>
+          </a:lnRef>
+          <a:fillRef idx="0">
+            <a:schemeClr val="accent1"/>
+          </a:fillRef>
+          <a:effectRef idx="0">
+            <a:schemeClr val="accent1"/>
+          </a:effectRef>
+          <a:fontRef idx="minor">
+            <a:schemeClr val="tx1"/>
+          </a:fontRef>
+        </p:style>
+      </p:cxnSp>
+      <p:cxnSp>
+        <p:nvCxnSpPr>
+          <p:cNvPr id="32" name="Straight Arrow Connector 31"/>
+          <p:cNvCxnSpPr/>
+          <p:nvPr/>
+        </p:nvCxnSpPr>
+        <p:spPr>
+          <a:xfrm>
+            <a:off x="3929620" y="3893963"/>
+            <a:ext cx="708284" cy="0"/>
+          </a:xfrm>
+          <a:prstGeom prst="straightConnector1">
+            <a:avLst/>
+          </a:prstGeom>
+          <a:ln w="38100">
+            <a:headEnd type="triangle" w="med" len="med"/>
+            <a:tailEnd type="none" w="med" len="med"/>
+          </a:ln>
+        </p:spPr>
+        <p:style>
+          <a:lnRef idx="1">
+            <a:schemeClr val="accent1"/>
+          </a:lnRef>
+          <a:fillRef idx="0">
+            <a:schemeClr val="accent1"/>
+          </a:fillRef>
+          <a:effectRef idx="0">
+            <a:schemeClr val="accent1"/>
+          </a:effectRef>
+          <a:fontRef idx="minor">
+            <a:schemeClr val="tx1"/>
+          </a:fontRef>
+        </p:style>
+      </p:cxnSp>
+      <p:cxnSp>
+        <p:nvCxnSpPr>
+          <p:cNvPr id="33" name="Straight Arrow Connector 32"/>
+          <p:cNvCxnSpPr/>
+          <p:nvPr/>
+        </p:nvCxnSpPr>
+        <p:spPr>
+          <a:xfrm flipH="1" flipV="1">
+            <a:off x="6768642" y="4255980"/>
+            <a:ext cx="1408910" cy="985377"/>
+          </a:xfrm>
+          <a:prstGeom prst="straightConnector1">
+            <a:avLst/>
+          </a:prstGeom>
+          <a:ln w="38100">
+            <a:headEnd type="triangle" w="med" len="med"/>
+            <a:tailEnd type="none" w="med" len="med"/>
+          </a:ln>
+        </p:spPr>
+        <p:style>
+          <a:lnRef idx="1">
+            <a:schemeClr val="accent1"/>
+          </a:lnRef>
+          <a:fillRef idx="0">
+            <a:schemeClr val="accent1"/>
+          </a:fillRef>
+          <a:effectRef idx="0">
+            <a:schemeClr val="accent1"/>
+          </a:effectRef>
+          <a:fontRef idx="minor">
+            <a:schemeClr val="tx1"/>
+          </a:fontRef>
+        </p:style>
+      </p:cxnSp>
+      <p:cxnSp>
+        <p:nvCxnSpPr>
+          <p:cNvPr id="34" name="Straight Arrow Connector 33"/>
+          <p:cNvCxnSpPr>
+            <a:stCxn id="11" idx="3"/>
+            <a:endCxn id="10" idx="1"/>
+          </p:cNvCxnSpPr>
+          <p:nvPr/>
+        </p:nvCxnSpPr>
+        <p:spPr>
+          <a:xfrm>
+            <a:off x="3993819" y="5420352"/>
+            <a:ext cx="1396791" cy="0"/>
+          </a:xfrm>
+          <a:prstGeom prst="straightConnector1">
+            <a:avLst/>
+          </a:prstGeom>
+          <a:ln w="38100">
+            <a:headEnd type="triangle" w="med" len="med"/>
+            <a:tailEnd type="none" w="med" len="med"/>
+          </a:ln>
+        </p:spPr>
+        <p:style>
+          <a:lnRef idx="1">
+            <a:schemeClr val="accent1"/>
+          </a:lnRef>
+          <a:fillRef idx="0">
+            <a:schemeClr val="accent1"/>
+          </a:fillRef>
+          <a:effectRef idx="0">
+            <a:schemeClr val="accent1"/>
+          </a:effectRef>
+          <a:fontRef idx="minor">
+            <a:schemeClr val="tx1"/>
+          </a:fontRef>
+        </p:style>
+      </p:cxnSp>
+      <p:sp>
+        <p:nvSpPr>
+          <p:cNvPr id="39" name="TextBox 38"/>
+          <p:cNvSpPr txBox="1"/>
+          <p:nvPr/>
+        </p:nvSpPr>
+        <p:spPr>
+          <a:xfrm>
+            <a:off x="4141633" y="1218019"/>
+            <a:ext cx="3248005" cy="830997"/>
+          </a:xfrm>
+          <a:prstGeom prst="rect">
+            <a:avLst/>
+          </a:prstGeom>
+          <a:noFill/>
+        </p:spPr>
+        <p:txBody>
+          <a:bodyPr wrap="none" rtlCol="0">
+            <a:spAutoFit/>
+          </a:bodyPr>
+          <a:lstStyle/>
+          <a:p>
+            <a:r>
+              <a:rPr lang="en-GB" sz="4800" b="1" dirty="0" smtClean="0">
+                <a:solidFill>
+                  <a:srgbClr val="FF0000"/>
+                </a:solidFill>
+              </a:rPr>
+              <a:t>WHAT IS IT?</a:t>
+            </a:r>
+            <a:endParaRPr lang="en-GB" sz="4800" b="1" dirty="0">
+              <a:solidFill>
+                <a:srgbClr val="FF0000"/>
+              </a:solidFill>
+            </a:endParaRPr>
+          </a:p>
+        </p:txBody>
+      </p:sp>
     </p:spTree>
     <p:extLst>
       <p:ext uri="{BB962C8B-B14F-4D97-AF65-F5344CB8AC3E}">
@@ -3004,6 +3700,2967 @@
   <p:clrMapOvr>
     <a:masterClrMapping/>
   </p:clrMapOvr>
+  <p:timing>
+    <p:tnLst>
+      <p:par>
+        <p:cTn id="1" dur="indefinite" restart="never" nodeType="tmRoot">
+          <p:childTnLst>
+            <p:seq concurrent="1" nextAc="seek">
+              <p:cTn id="2" dur="indefinite" nodeType="mainSeq">
+                <p:childTnLst>
+                  <p:par>
+                    <p:cTn id="3" fill="hold">
+                      <p:stCondLst>
+                        <p:cond delay="indefinite"/>
+                      </p:stCondLst>
+                      <p:childTnLst>
+                        <p:par>
+                          <p:cTn id="4" fill="hold">
+                            <p:stCondLst>
+                              <p:cond delay="0"/>
+                            </p:stCondLst>
+                            <p:childTnLst>
+                              <p:par>
+                                <p:cTn id="5" presetID="22" presetClass="entr" presetSubtype="4" fill="hold" grpId="0" nodeType="clickEffect">
+                                  <p:stCondLst>
+                                    <p:cond delay="0"/>
+                                  </p:stCondLst>
+                                  <p:childTnLst>
+                                    <p:set>
+                                      <p:cBhvr>
+                                        <p:cTn id="6" dur="1" fill="hold">
+                                          <p:stCondLst>
+                                            <p:cond delay="0"/>
+                                          </p:stCondLst>
+                                        </p:cTn>
+                                        <p:tgtEl>
+                                          <p:spTgt spid="39"/>
+                                        </p:tgtEl>
+                                        <p:attrNameLst>
+                                          <p:attrName>style.visibility</p:attrName>
+                                        </p:attrNameLst>
+                                      </p:cBhvr>
+                                      <p:to>
+                                        <p:strVal val="visible"/>
+                                      </p:to>
+                                    </p:set>
+                                    <p:animEffect transition="in" filter="wipe(down)">
+                                      <p:cBhvr>
+                                        <p:cTn id="7" dur="500"/>
+                                        <p:tgtEl>
+                                          <p:spTgt spid="39"/>
+                                        </p:tgtEl>
+                                      </p:cBhvr>
+                                    </p:animEffect>
+                                  </p:childTnLst>
+                                </p:cTn>
+                              </p:par>
+                            </p:childTnLst>
+                          </p:cTn>
+                        </p:par>
+                      </p:childTnLst>
+                    </p:cTn>
+                  </p:par>
+                  <p:par>
+                    <p:cTn id="8" fill="hold">
+                      <p:stCondLst>
+                        <p:cond delay="indefinite"/>
+                      </p:stCondLst>
+                      <p:childTnLst>
+                        <p:par>
+                          <p:cTn id="9" fill="hold">
+                            <p:stCondLst>
+                              <p:cond delay="0"/>
+                            </p:stCondLst>
+                            <p:childTnLst>
+                              <p:par>
+                                <p:cTn id="10" presetID="22" presetClass="exit" presetSubtype="4" fill="hold" grpId="1" nodeType="clickEffect">
+                                  <p:stCondLst>
+                                    <p:cond delay="0"/>
+                                  </p:stCondLst>
+                                  <p:childTnLst>
+                                    <p:animEffect transition="out" filter="wipe(down)">
+                                      <p:cBhvr>
+                                        <p:cTn id="11" dur="500"/>
+                                        <p:tgtEl>
+                                          <p:spTgt spid="39"/>
+                                        </p:tgtEl>
+                                      </p:cBhvr>
+                                    </p:animEffect>
+                                    <p:set>
+                                      <p:cBhvr>
+                                        <p:cTn id="12" dur="1" fill="hold">
+                                          <p:stCondLst>
+                                            <p:cond delay="499"/>
+                                          </p:stCondLst>
+                                        </p:cTn>
+                                        <p:tgtEl>
+                                          <p:spTgt spid="39"/>
+                                        </p:tgtEl>
+                                        <p:attrNameLst>
+                                          <p:attrName>style.visibility</p:attrName>
+                                        </p:attrNameLst>
+                                      </p:cBhvr>
+                                      <p:to>
+                                        <p:strVal val="hidden"/>
+                                      </p:to>
+                                    </p:set>
+                                  </p:childTnLst>
+                                </p:cTn>
+                              </p:par>
+                            </p:childTnLst>
+                          </p:cTn>
+                        </p:par>
+                        <p:par>
+                          <p:cTn id="13" fill="hold">
+                            <p:stCondLst>
+                              <p:cond delay="500"/>
+                            </p:stCondLst>
+                            <p:childTnLst>
+                              <p:par>
+                                <p:cTn id="14" presetID="14" presetClass="entr" presetSubtype="10" fill="hold" nodeType="afterEffect">
+                                  <p:stCondLst>
+                                    <p:cond delay="0"/>
+                                  </p:stCondLst>
+                                  <p:childTnLst>
+                                    <p:set>
+                                      <p:cBhvr>
+                                        <p:cTn id="15" dur="1" fill="hold">
+                                          <p:stCondLst>
+                                            <p:cond delay="0"/>
+                                          </p:stCondLst>
+                                        </p:cTn>
+                                        <p:tgtEl>
+                                          <p:spTgt spid="14"/>
+                                        </p:tgtEl>
+                                        <p:attrNameLst>
+                                          <p:attrName>style.visibility</p:attrName>
+                                        </p:attrNameLst>
+                                      </p:cBhvr>
+                                      <p:to>
+                                        <p:strVal val="visible"/>
+                                      </p:to>
+                                    </p:set>
+                                    <p:animEffect transition="in" filter="randombar(horizontal)">
+                                      <p:cBhvr>
+                                        <p:cTn id="16" dur="500"/>
+                                        <p:tgtEl>
+                                          <p:spTgt spid="14"/>
+                                        </p:tgtEl>
+                                      </p:cBhvr>
+                                    </p:animEffect>
+                                  </p:childTnLst>
+                                </p:cTn>
+                              </p:par>
+                            </p:childTnLst>
+                          </p:cTn>
+                        </p:par>
+                        <p:par>
+                          <p:cTn id="17" fill="hold">
+                            <p:stCondLst>
+                              <p:cond delay="1000"/>
+                            </p:stCondLst>
+                            <p:childTnLst>
+                              <p:par>
+                                <p:cTn id="18" presetID="14" presetClass="entr" presetSubtype="10" fill="hold" grpId="0" nodeType="afterEffect">
+                                  <p:stCondLst>
+                                    <p:cond delay="0"/>
+                                  </p:stCondLst>
+                                  <p:childTnLst>
+                                    <p:set>
+                                      <p:cBhvr>
+                                        <p:cTn id="19" dur="1" fill="hold">
+                                          <p:stCondLst>
+                                            <p:cond delay="0"/>
+                                          </p:stCondLst>
+                                        </p:cTn>
+                                        <p:tgtEl>
+                                          <p:spTgt spid="2"/>
+                                        </p:tgtEl>
+                                        <p:attrNameLst>
+                                          <p:attrName>style.visibility</p:attrName>
+                                        </p:attrNameLst>
+                                      </p:cBhvr>
+                                      <p:to>
+                                        <p:strVal val="visible"/>
+                                      </p:to>
+                                    </p:set>
+                                    <p:animEffect transition="in" filter="randombar(horizontal)">
+                                      <p:cBhvr>
+                                        <p:cTn id="20" dur="500"/>
+                                        <p:tgtEl>
+                                          <p:spTgt spid="2"/>
+                                        </p:tgtEl>
+                                      </p:cBhvr>
+                                    </p:animEffect>
+                                  </p:childTnLst>
+                                </p:cTn>
+                              </p:par>
+                            </p:childTnLst>
+                          </p:cTn>
+                        </p:par>
+                      </p:childTnLst>
+                    </p:cTn>
+                  </p:par>
+                  <p:par>
+                    <p:cTn id="21" fill="hold">
+                      <p:stCondLst>
+                        <p:cond delay="indefinite"/>
+                      </p:stCondLst>
+                      <p:childTnLst>
+                        <p:par>
+                          <p:cTn id="22" fill="hold">
+                            <p:stCondLst>
+                              <p:cond delay="0"/>
+                            </p:stCondLst>
+                            <p:childTnLst>
+                              <p:par>
+                                <p:cTn id="23" presetID="14" presetClass="entr" presetSubtype="10" fill="hold" nodeType="clickEffect">
+                                  <p:stCondLst>
+                                    <p:cond delay="0"/>
+                                  </p:stCondLst>
+                                  <p:childTnLst>
+                                    <p:set>
+                                      <p:cBhvr>
+                                        <p:cTn id="24" dur="1" fill="hold">
+                                          <p:stCondLst>
+                                            <p:cond delay="0"/>
+                                          </p:stCondLst>
+                                        </p:cTn>
+                                        <p:tgtEl>
+                                          <p:spTgt spid="15"/>
+                                        </p:tgtEl>
+                                        <p:attrNameLst>
+                                          <p:attrName>style.visibility</p:attrName>
+                                        </p:attrNameLst>
+                                      </p:cBhvr>
+                                      <p:to>
+                                        <p:strVal val="visible"/>
+                                      </p:to>
+                                    </p:set>
+                                    <p:animEffect transition="in" filter="randombar(horizontal)">
+                                      <p:cBhvr>
+                                        <p:cTn id="25" dur="500"/>
+                                        <p:tgtEl>
+                                          <p:spTgt spid="15"/>
+                                        </p:tgtEl>
+                                      </p:cBhvr>
+                                    </p:animEffect>
+                                  </p:childTnLst>
+                                </p:cTn>
+                              </p:par>
+                            </p:childTnLst>
+                          </p:cTn>
+                        </p:par>
+                        <p:par>
+                          <p:cTn id="26" fill="hold">
+                            <p:stCondLst>
+                              <p:cond delay="500"/>
+                            </p:stCondLst>
+                            <p:childTnLst>
+                              <p:par>
+                                <p:cTn id="27" presetID="14" presetClass="entr" presetSubtype="10" fill="hold" grpId="0" nodeType="afterEffect">
+                                  <p:stCondLst>
+                                    <p:cond delay="0"/>
+                                  </p:stCondLst>
+                                  <p:childTnLst>
+                                    <p:set>
+                                      <p:cBhvr>
+                                        <p:cTn id="28" dur="1" fill="hold">
+                                          <p:stCondLst>
+                                            <p:cond delay="0"/>
+                                          </p:stCondLst>
+                                        </p:cTn>
+                                        <p:tgtEl>
+                                          <p:spTgt spid="4"/>
+                                        </p:tgtEl>
+                                        <p:attrNameLst>
+                                          <p:attrName>style.visibility</p:attrName>
+                                        </p:attrNameLst>
+                                      </p:cBhvr>
+                                      <p:to>
+                                        <p:strVal val="visible"/>
+                                      </p:to>
+                                    </p:set>
+                                    <p:animEffect transition="in" filter="randombar(horizontal)">
+                                      <p:cBhvr>
+                                        <p:cTn id="29" dur="500"/>
+                                        <p:tgtEl>
+                                          <p:spTgt spid="4"/>
+                                        </p:tgtEl>
+                                      </p:cBhvr>
+                                    </p:animEffect>
+                                  </p:childTnLst>
+                                </p:cTn>
+                              </p:par>
+                            </p:childTnLst>
+                          </p:cTn>
+                        </p:par>
+                      </p:childTnLst>
+                    </p:cTn>
+                  </p:par>
+                  <p:par>
+                    <p:cTn id="30" fill="hold">
+                      <p:stCondLst>
+                        <p:cond delay="indefinite"/>
+                      </p:stCondLst>
+                      <p:childTnLst>
+                        <p:par>
+                          <p:cTn id="31" fill="hold">
+                            <p:stCondLst>
+                              <p:cond delay="0"/>
+                            </p:stCondLst>
+                            <p:childTnLst>
+                              <p:par>
+                                <p:cTn id="32" presetID="14" presetClass="entr" presetSubtype="10" fill="hold" nodeType="clickEffect">
+                                  <p:stCondLst>
+                                    <p:cond delay="0"/>
+                                  </p:stCondLst>
+                                  <p:childTnLst>
+                                    <p:set>
+                                      <p:cBhvr>
+                                        <p:cTn id="33" dur="1" fill="hold">
+                                          <p:stCondLst>
+                                            <p:cond delay="0"/>
+                                          </p:stCondLst>
+                                        </p:cTn>
+                                        <p:tgtEl>
+                                          <p:spTgt spid="22"/>
+                                        </p:tgtEl>
+                                        <p:attrNameLst>
+                                          <p:attrName>style.visibility</p:attrName>
+                                        </p:attrNameLst>
+                                      </p:cBhvr>
+                                      <p:to>
+                                        <p:strVal val="visible"/>
+                                      </p:to>
+                                    </p:set>
+                                    <p:animEffect transition="in" filter="randombar(horizontal)">
+                                      <p:cBhvr>
+                                        <p:cTn id="34" dur="500"/>
+                                        <p:tgtEl>
+                                          <p:spTgt spid="22"/>
+                                        </p:tgtEl>
+                                      </p:cBhvr>
+                                    </p:animEffect>
+                                  </p:childTnLst>
+                                </p:cTn>
+                              </p:par>
+                            </p:childTnLst>
+                          </p:cTn>
+                        </p:par>
+                        <p:par>
+                          <p:cTn id="35" fill="hold">
+                            <p:stCondLst>
+                              <p:cond delay="500"/>
+                            </p:stCondLst>
+                            <p:childTnLst>
+                              <p:par>
+                                <p:cTn id="36" presetID="14" presetClass="entr" presetSubtype="10" fill="hold" grpId="0" nodeType="afterEffect">
+                                  <p:stCondLst>
+                                    <p:cond delay="0"/>
+                                  </p:stCondLst>
+                                  <p:childTnLst>
+                                    <p:set>
+                                      <p:cBhvr>
+                                        <p:cTn id="37" dur="1" fill="hold">
+                                          <p:stCondLst>
+                                            <p:cond delay="0"/>
+                                          </p:stCondLst>
+                                        </p:cTn>
+                                        <p:tgtEl>
+                                          <p:spTgt spid="5"/>
+                                        </p:tgtEl>
+                                        <p:attrNameLst>
+                                          <p:attrName>style.visibility</p:attrName>
+                                        </p:attrNameLst>
+                                      </p:cBhvr>
+                                      <p:to>
+                                        <p:strVal val="visible"/>
+                                      </p:to>
+                                    </p:set>
+                                    <p:animEffect transition="in" filter="randombar(horizontal)">
+                                      <p:cBhvr>
+                                        <p:cTn id="38" dur="500"/>
+                                        <p:tgtEl>
+                                          <p:spTgt spid="5"/>
+                                        </p:tgtEl>
+                                      </p:cBhvr>
+                                    </p:animEffect>
+                                  </p:childTnLst>
+                                </p:cTn>
+                              </p:par>
+                            </p:childTnLst>
+                          </p:cTn>
+                        </p:par>
+                      </p:childTnLst>
+                    </p:cTn>
+                  </p:par>
+                  <p:par>
+                    <p:cTn id="39" fill="hold">
+                      <p:stCondLst>
+                        <p:cond delay="indefinite"/>
+                      </p:stCondLst>
+                      <p:childTnLst>
+                        <p:par>
+                          <p:cTn id="40" fill="hold">
+                            <p:stCondLst>
+                              <p:cond delay="0"/>
+                            </p:stCondLst>
+                            <p:childTnLst>
+                              <p:par>
+                                <p:cTn id="41" presetID="14" presetClass="entr" presetSubtype="5" fill="hold" nodeType="clickEffect">
+                                  <p:stCondLst>
+                                    <p:cond delay="0"/>
+                                  </p:stCondLst>
+                                  <p:childTnLst>
+                                    <p:set>
+                                      <p:cBhvr>
+                                        <p:cTn id="42" dur="1" fill="hold">
+                                          <p:stCondLst>
+                                            <p:cond delay="0"/>
+                                          </p:stCondLst>
+                                        </p:cTn>
+                                        <p:tgtEl>
+                                          <p:spTgt spid="27"/>
+                                        </p:tgtEl>
+                                        <p:attrNameLst>
+                                          <p:attrName>style.visibility</p:attrName>
+                                        </p:attrNameLst>
+                                      </p:cBhvr>
+                                      <p:to>
+                                        <p:strVal val="visible"/>
+                                      </p:to>
+                                    </p:set>
+                                    <p:animEffect transition="in" filter="randombar(vertical)">
+                                      <p:cBhvr>
+                                        <p:cTn id="43" dur="500"/>
+                                        <p:tgtEl>
+                                          <p:spTgt spid="27"/>
+                                        </p:tgtEl>
+                                      </p:cBhvr>
+                                    </p:animEffect>
+                                  </p:childTnLst>
+                                </p:cTn>
+                              </p:par>
+                            </p:childTnLst>
+                          </p:cTn>
+                        </p:par>
+                        <p:par>
+                          <p:cTn id="44" fill="hold">
+                            <p:stCondLst>
+                              <p:cond delay="500"/>
+                            </p:stCondLst>
+                            <p:childTnLst>
+                              <p:par>
+                                <p:cTn id="45" presetID="14" presetClass="entr" presetSubtype="5" fill="hold" grpId="0" nodeType="afterEffect">
+                                  <p:stCondLst>
+                                    <p:cond delay="0"/>
+                                  </p:stCondLst>
+                                  <p:childTnLst>
+                                    <p:set>
+                                      <p:cBhvr>
+                                        <p:cTn id="46" dur="1" fill="hold">
+                                          <p:stCondLst>
+                                            <p:cond delay="0"/>
+                                          </p:stCondLst>
+                                        </p:cTn>
+                                        <p:tgtEl>
+                                          <p:spTgt spid="7"/>
+                                        </p:tgtEl>
+                                        <p:attrNameLst>
+                                          <p:attrName>style.visibility</p:attrName>
+                                        </p:attrNameLst>
+                                      </p:cBhvr>
+                                      <p:to>
+                                        <p:strVal val="visible"/>
+                                      </p:to>
+                                    </p:set>
+                                    <p:animEffect transition="in" filter="randombar(vertical)">
+                                      <p:cBhvr>
+                                        <p:cTn id="47" dur="500"/>
+                                        <p:tgtEl>
+                                          <p:spTgt spid="7"/>
+                                        </p:tgtEl>
+                                      </p:cBhvr>
+                                    </p:animEffect>
+                                  </p:childTnLst>
+                                </p:cTn>
+                              </p:par>
+                            </p:childTnLst>
+                          </p:cTn>
+                        </p:par>
+                      </p:childTnLst>
+                    </p:cTn>
+                  </p:par>
+                  <p:par>
+                    <p:cTn id="48" fill="hold">
+                      <p:stCondLst>
+                        <p:cond delay="indefinite"/>
+                      </p:stCondLst>
+                      <p:childTnLst>
+                        <p:par>
+                          <p:cTn id="49" fill="hold">
+                            <p:stCondLst>
+                              <p:cond delay="0"/>
+                            </p:stCondLst>
+                            <p:childTnLst>
+                              <p:par>
+                                <p:cTn id="50" presetID="14" presetClass="entr" presetSubtype="5" fill="hold" nodeType="clickEffect">
+                                  <p:stCondLst>
+                                    <p:cond delay="0"/>
+                                  </p:stCondLst>
+                                  <p:childTnLst>
+                                    <p:set>
+                                      <p:cBhvr>
+                                        <p:cTn id="51" dur="1" fill="hold">
+                                          <p:stCondLst>
+                                            <p:cond delay="0"/>
+                                          </p:stCondLst>
+                                        </p:cTn>
+                                        <p:tgtEl>
+                                          <p:spTgt spid="30"/>
+                                        </p:tgtEl>
+                                        <p:attrNameLst>
+                                          <p:attrName>style.visibility</p:attrName>
+                                        </p:attrNameLst>
+                                      </p:cBhvr>
+                                      <p:to>
+                                        <p:strVal val="visible"/>
+                                      </p:to>
+                                    </p:set>
+                                    <p:animEffect transition="in" filter="randombar(vertical)">
+                                      <p:cBhvr>
+                                        <p:cTn id="52" dur="500"/>
+                                        <p:tgtEl>
+                                          <p:spTgt spid="30"/>
+                                        </p:tgtEl>
+                                      </p:cBhvr>
+                                    </p:animEffect>
+                                  </p:childTnLst>
+                                </p:cTn>
+                              </p:par>
+                            </p:childTnLst>
+                          </p:cTn>
+                        </p:par>
+                        <p:par>
+                          <p:cTn id="53" fill="hold">
+                            <p:stCondLst>
+                              <p:cond delay="500"/>
+                            </p:stCondLst>
+                            <p:childTnLst>
+                              <p:par>
+                                <p:cTn id="54" presetID="14" presetClass="entr" presetSubtype="5" fill="hold" grpId="0" nodeType="afterEffect">
+                                  <p:stCondLst>
+                                    <p:cond delay="0"/>
+                                  </p:stCondLst>
+                                  <p:childTnLst>
+                                    <p:set>
+                                      <p:cBhvr>
+                                        <p:cTn id="55" dur="1" fill="hold">
+                                          <p:stCondLst>
+                                            <p:cond delay="0"/>
+                                          </p:stCondLst>
+                                        </p:cTn>
+                                        <p:tgtEl>
+                                          <p:spTgt spid="8"/>
+                                        </p:tgtEl>
+                                        <p:attrNameLst>
+                                          <p:attrName>style.visibility</p:attrName>
+                                        </p:attrNameLst>
+                                      </p:cBhvr>
+                                      <p:to>
+                                        <p:strVal val="visible"/>
+                                      </p:to>
+                                    </p:set>
+                                    <p:animEffect transition="in" filter="randombar(vertical)">
+                                      <p:cBhvr>
+                                        <p:cTn id="56" dur="500"/>
+                                        <p:tgtEl>
+                                          <p:spTgt spid="8"/>
+                                        </p:tgtEl>
+                                      </p:cBhvr>
+                                    </p:animEffect>
+                                  </p:childTnLst>
+                                </p:cTn>
+                              </p:par>
+                            </p:childTnLst>
+                          </p:cTn>
+                        </p:par>
+                      </p:childTnLst>
+                    </p:cTn>
+                  </p:par>
+                  <p:par>
+                    <p:cTn id="57" fill="hold">
+                      <p:stCondLst>
+                        <p:cond delay="indefinite"/>
+                      </p:stCondLst>
+                      <p:childTnLst>
+                        <p:par>
+                          <p:cTn id="58" fill="hold">
+                            <p:stCondLst>
+                              <p:cond delay="0"/>
+                            </p:stCondLst>
+                            <p:childTnLst>
+                              <p:par>
+                                <p:cTn id="59" presetID="14" presetClass="entr" presetSubtype="10" fill="hold" nodeType="clickEffect">
+                                  <p:stCondLst>
+                                    <p:cond delay="0"/>
+                                  </p:stCondLst>
+                                  <p:childTnLst>
+                                    <p:set>
+                                      <p:cBhvr>
+                                        <p:cTn id="60" dur="1" fill="hold">
+                                          <p:stCondLst>
+                                            <p:cond delay="0"/>
+                                          </p:stCondLst>
+                                        </p:cTn>
+                                        <p:tgtEl>
+                                          <p:spTgt spid="33"/>
+                                        </p:tgtEl>
+                                        <p:attrNameLst>
+                                          <p:attrName>style.visibility</p:attrName>
+                                        </p:attrNameLst>
+                                      </p:cBhvr>
+                                      <p:to>
+                                        <p:strVal val="visible"/>
+                                      </p:to>
+                                    </p:set>
+                                    <p:animEffect transition="in" filter="randombar(horizontal)">
+                                      <p:cBhvr>
+                                        <p:cTn id="61" dur="500"/>
+                                        <p:tgtEl>
+                                          <p:spTgt spid="33"/>
+                                        </p:tgtEl>
+                                      </p:cBhvr>
+                                    </p:animEffect>
+                                  </p:childTnLst>
+                                </p:cTn>
+                              </p:par>
+                            </p:childTnLst>
+                          </p:cTn>
+                        </p:par>
+                        <p:par>
+                          <p:cTn id="62" fill="hold">
+                            <p:stCondLst>
+                              <p:cond delay="500"/>
+                            </p:stCondLst>
+                            <p:childTnLst>
+                              <p:par>
+                                <p:cTn id="63" presetID="14" presetClass="entr" presetSubtype="10" fill="hold" grpId="0" nodeType="afterEffect">
+                                  <p:stCondLst>
+                                    <p:cond delay="0"/>
+                                  </p:stCondLst>
+                                  <p:childTnLst>
+                                    <p:set>
+                                      <p:cBhvr>
+                                        <p:cTn id="64" dur="1" fill="hold">
+                                          <p:stCondLst>
+                                            <p:cond delay="0"/>
+                                          </p:stCondLst>
+                                        </p:cTn>
+                                        <p:tgtEl>
+                                          <p:spTgt spid="9"/>
+                                        </p:tgtEl>
+                                        <p:attrNameLst>
+                                          <p:attrName>style.visibility</p:attrName>
+                                        </p:attrNameLst>
+                                      </p:cBhvr>
+                                      <p:to>
+                                        <p:strVal val="visible"/>
+                                      </p:to>
+                                    </p:set>
+                                    <p:animEffect transition="in" filter="randombar(horizontal)">
+                                      <p:cBhvr>
+                                        <p:cTn id="65" dur="500"/>
+                                        <p:tgtEl>
+                                          <p:spTgt spid="9"/>
+                                        </p:tgtEl>
+                                      </p:cBhvr>
+                                    </p:animEffect>
+                                  </p:childTnLst>
+                                </p:cTn>
+                              </p:par>
+                            </p:childTnLst>
+                          </p:cTn>
+                        </p:par>
+                      </p:childTnLst>
+                    </p:cTn>
+                  </p:par>
+                  <p:par>
+                    <p:cTn id="66" fill="hold">
+                      <p:stCondLst>
+                        <p:cond delay="indefinite"/>
+                      </p:stCondLst>
+                      <p:childTnLst>
+                        <p:par>
+                          <p:cTn id="67" fill="hold">
+                            <p:stCondLst>
+                              <p:cond delay="0"/>
+                            </p:stCondLst>
+                            <p:childTnLst>
+                              <p:par>
+                                <p:cTn id="68" presetID="14" presetClass="entr" presetSubtype="10" fill="hold" nodeType="clickEffect">
+                                  <p:stCondLst>
+                                    <p:cond delay="0"/>
+                                  </p:stCondLst>
+                                  <p:childTnLst>
+                                    <p:set>
+                                      <p:cBhvr>
+                                        <p:cTn id="69" dur="1" fill="hold">
+                                          <p:stCondLst>
+                                            <p:cond delay="0"/>
+                                          </p:stCondLst>
+                                        </p:cTn>
+                                        <p:tgtEl>
+                                          <p:spTgt spid="21"/>
+                                        </p:tgtEl>
+                                        <p:attrNameLst>
+                                          <p:attrName>style.visibility</p:attrName>
+                                        </p:attrNameLst>
+                                      </p:cBhvr>
+                                      <p:to>
+                                        <p:strVal val="visible"/>
+                                      </p:to>
+                                    </p:set>
+                                    <p:animEffect transition="in" filter="randombar(horizontal)">
+                                      <p:cBhvr>
+                                        <p:cTn id="70" dur="500"/>
+                                        <p:tgtEl>
+                                          <p:spTgt spid="21"/>
+                                        </p:tgtEl>
+                                      </p:cBhvr>
+                                    </p:animEffect>
+                                  </p:childTnLst>
+                                </p:cTn>
+                              </p:par>
+                            </p:childTnLst>
+                          </p:cTn>
+                        </p:par>
+                        <p:par>
+                          <p:cTn id="71" fill="hold">
+                            <p:stCondLst>
+                              <p:cond delay="500"/>
+                            </p:stCondLst>
+                            <p:childTnLst>
+                              <p:par>
+                                <p:cTn id="72" presetID="14" presetClass="entr" presetSubtype="10" fill="hold" grpId="0" nodeType="afterEffect">
+                                  <p:stCondLst>
+                                    <p:cond delay="0"/>
+                                  </p:stCondLst>
+                                  <p:childTnLst>
+                                    <p:set>
+                                      <p:cBhvr>
+                                        <p:cTn id="73" dur="1" fill="hold">
+                                          <p:stCondLst>
+                                            <p:cond delay="0"/>
+                                          </p:stCondLst>
+                                        </p:cTn>
+                                        <p:tgtEl>
+                                          <p:spTgt spid="10"/>
+                                        </p:tgtEl>
+                                        <p:attrNameLst>
+                                          <p:attrName>style.visibility</p:attrName>
+                                        </p:attrNameLst>
+                                      </p:cBhvr>
+                                      <p:to>
+                                        <p:strVal val="visible"/>
+                                      </p:to>
+                                    </p:set>
+                                    <p:animEffect transition="in" filter="randombar(horizontal)">
+                                      <p:cBhvr>
+                                        <p:cTn id="74" dur="500"/>
+                                        <p:tgtEl>
+                                          <p:spTgt spid="10"/>
+                                        </p:tgtEl>
+                                      </p:cBhvr>
+                                    </p:animEffect>
+                                  </p:childTnLst>
+                                </p:cTn>
+                              </p:par>
+                            </p:childTnLst>
+                          </p:cTn>
+                        </p:par>
+                      </p:childTnLst>
+                    </p:cTn>
+                  </p:par>
+                  <p:par>
+                    <p:cTn id="75" fill="hold">
+                      <p:stCondLst>
+                        <p:cond delay="indefinite"/>
+                      </p:stCondLst>
+                      <p:childTnLst>
+                        <p:par>
+                          <p:cTn id="76" fill="hold">
+                            <p:stCondLst>
+                              <p:cond delay="0"/>
+                            </p:stCondLst>
+                            <p:childTnLst>
+                              <p:par>
+                                <p:cTn id="77" presetID="14" presetClass="entr" presetSubtype="5" fill="hold" nodeType="clickEffect">
+                                  <p:stCondLst>
+                                    <p:cond delay="0"/>
+                                  </p:stCondLst>
+                                  <p:childTnLst>
+                                    <p:set>
+                                      <p:cBhvr>
+                                        <p:cTn id="78" dur="1" fill="hold">
+                                          <p:stCondLst>
+                                            <p:cond delay="0"/>
+                                          </p:stCondLst>
+                                        </p:cTn>
+                                        <p:tgtEl>
+                                          <p:spTgt spid="34"/>
+                                        </p:tgtEl>
+                                        <p:attrNameLst>
+                                          <p:attrName>style.visibility</p:attrName>
+                                        </p:attrNameLst>
+                                      </p:cBhvr>
+                                      <p:to>
+                                        <p:strVal val="visible"/>
+                                      </p:to>
+                                    </p:set>
+                                    <p:animEffect transition="in" filter="randombar(vertical)">
+                                      <p:cBhvr>
+                                        <p:cTn id="79" dur="500"/>
+                                        <p:tgtEl>
+                                          <p:spTgt spid="34"/>
+                                        </p:tgtEl>
+                                      </p:cBhvr>
+                                    </p:animEffect>
+                                  </p:childTnLst>
+                                </p:cTn>
+                              </p:par>
+                            </p:childTnLst>
+                          </p:cTn>
+                        </p:par>
+                        <p:par>
+                          <p:cTn id="80" fill="hold">
+                            <p:stCondLst>
+                              <p:cond delay="500"/>
+                            </p:stCondLst>
+                            <p:childTnLst>
+                              <p:par>
+                                <p:cTn id="81" presetID="14" presetClass="entr" presetSubtype="5" fill="hold" grpId="0" nodeType="afterEffect">
+                                  <p:stCondLst>
+                                    <p:cond delay="0"/>
+                                  </p:stCondLst>
+                                  <p:childTnLst>
+                                    <p:set>
+                                      <p:cBhvr>
+                                        <p:cTn id="82" dur="1" fill="hold">
+                                          <p:stCondLst>
+                                            <p:cond delay="0"/>
+                                          </p:stCondLst>
+                                        </p:cTn>
+                                        <p:tgtEl>
+                                          <p:spTgt spid="11"/>
+                                        </p:tgtEl>
+                                        <p:attrNameLst>
+                                          <p:attrName>style.visibility</p:attrName>
+                                        </p:attrNameLst>
+                                      </p:cBhvr>
+                                      <p:to>
+                                        <p:strVal val="visible"/>
+                                      </p:to>
+                                    </p:set>
+                                    <p:animEffect transition="in" filter="randombar(vertical)">
+                                      <p:cBhvr>
+                                        <p:cTn id="83" dur="500"/>
+                                        <p:tgtEl>
+                                          <p:spTgt spid="11"/>
+                                        </p:tgtEl>
+                                      </p:cBhvr>
+                                    </p:animEffect>
+                                  </p:childTnLst>
+                                </p:cTn>
+                              </p:par>
+                            </p:childTnLst>
+                          </p:cTn>
+                        </p:par>
+                      </p:childTnLst>
+                    </p:cTn>
+                  </p:par>
+                  <p:par>
+                    <p:cTn id="84" fill="hold">
+                      <p:stCondLst>
+                        <p:cond delay="indefinite"/>
+                      </p:stCondLst>
+                      <p:childTnLst>
+                        <p:par>
+                          <p:cTn id="85" fill="hold">
+                            <p:stCondLst>
+                              <p:cond delay="0"/>
+                            </p:stCondLst>
+                            <p:childTnLst>
+                              <p:par>
+                                <p:cTn id="86" presetID="14" presetClass="entr" presetSubtype="5" fill="hold" nodeType="clickEffect">
+                                  <p:stCondLst>
+                                    <p:cond delay="0"/>
+                                  </p:stCondLst>
+                                  <p:childTnLst>
+                                    <p:set>
+                                      <p:cBhvr>
+                                        <p:cTn id="87" dur="1" fill="hold">
+                                          <p:stCondLst>
+                                            <p:cond delay="0"/>
+                                          </p:stCondLst>
+                                        </p:cTn>
+                                        <p:tgtEl>
+                                          <p:spTgt spid="32"/>
+                                        </p:tgtEl>
+                                        <p:attrNameLst>
+                                          <p:attrName>style.visibility</p:attrName>
+                                        </p:attrNameLst>
+                                      </p:cBhvr>
+                                      <p:to>
+                                        <p:strVal val="visible"/>
+                                      </p:to>
+                                    </p:set>
+                                    <p:animEffect transition="in" filter="randombar(vertical)">
+                                      <p:cBhvr>
+                                        <p:cTn id="88" dur="500"/>
+                                        <p:tgtEl>
+                                          <p:spTgt spid="32"/>
+                                        </p:tgtEl>
+                                      </p:cBhvr>
+                                    </p:animEffect>
+                                  </p:childTnLst>
+                                </p:cTn>
+                              </p:par>
+                            </p:childTnLst>
+                          </p:cTn>
+                        </p:par>
+                        <p:par>
+                          <p:cTn id="89" fill="hold">
+                            <p:stCondLst>
+                              <p:cond delay="500"/>
+                            </p:stCondLst>
+                            <p:childTnLst>
+                              <p:par>
+                                <p:cTn id="90" presetID="14" presetClass="entr" presetSubtype="5" fill="hold" grpId="0" nodeType="afterEffect">
+                                  <p:stCondLst>
+                                    <p:cond delay="0"/>
+                                  </p:stCondLst>
+                                  <p:childTnLst>
+                                    <p:set>
+                                      <p:cBhvr>
+                                        <p:cTn id="91" dur="1" fill="hold">
+                                          <p:stCondLst>
+                                            <p:cond delay="0"/>
+                                          </p:stCondLst>
+                                        </p:cTn>
+                                        <p:tgtEl>
+                                          <p:spTgt spid="12"/>
+                                        </p:tgtEl>
+                                        <p:attrNameLst>
+                                          <p:attrName>style.visibility</p:attrName>
+                                        </p:attrNameLst>
+                                      </p:cBhvr>
+                                      <p:to>
+                                        <p:strVal val="visible"/>
+                                      </p:to>
+                                    </p:set>
+                                    <p:animEffect transition="in" filter="randombar(vertical)">
+                                      <p:cBhvr>
+                                        <p:cTn id="92" dur="500"/>
+                                        <p:tgtEl>
+                                          <p:spTgt spid="12"/>
+                                        </p:tgtEl>
+                                      </p:cBhvr>
+                                    </p:animEffect>
+                                  </p:childTnLst>
+                                </p:cTn>
+                              </p:par>
+                            </p:childTnLst>
+                          </p:cTn>
+                        </p:par>
+                      </p:childTnLst>
+                    </p:cTn>
+                  </p:par>
+                  <p:par>
+                    <p:cTn id="93" fill="hold">
+                      <p:stCondLst>
+                        <p:cond delay="indefinite"/>
+                      </p:stCondLst>
+                      <p:childTnLst>
+                        <p:par>
+                          <p:cTn id="94" fill="hold">
+                            <p:stCondLst>
+                              <p:cond delay="0"/>
+                            </p:stCondLst>
+                            <p:childTnLst>
+                              <p:par>
+                                <p:cTn id="95" presetID="14" presetClass="entr" presetSubtype="5" fill="hold" nodeType="clickEffect">
+                                  <p:stCondLst>
+                                    <p:cond delay="0"/>
+                                  </p:stCondLst>
+                                  <p:childTnLst>
+                                    <p:set>
+                                      <p:cBhvr>
+                                        <p:cTn id="96" dur="1" fill="hold">
+                                          <p:stCondLst>
+                                            <p:cond delay="0"/>
+                                          </p:stCondLst>
+                                        </p:cTn>
+                                        <p:tgtEl>
+                                          <p:spTgt spid="31"/>
+                                        </p:tgtEl>
+                                        <p:attrNameLst>
+                                          <p:attrName>style.visibility</p:attrName>
+                                        </p:attrNameLst>
+                                      </p:cBhvr>
+                                      <p:to>
+                                        <p:strVal val="visible"/>
+                                      </p:to>
+                                    </p:set>
+                                    <p:animEffect transition="in" filter="randombar(vertical)">
+                                      <p:cBhvr>
+                                        <p:cTn id="97" dur="500"/>
+                                        <p:tgtEl>
+                                          <p:spTgt spid="31"/>
+                                        </p:tgtEl>
+                                      </p:cBhvr>
+                                    </p:animEffect>
+                                  </p:childTnLst>
+                                </p:cTn>
+                              </p:par>
+                            </p:childTnLst>
+                          </p:cTn>
+                        </p:par>
+                        <p:par>
+                          <p:cTn id="98" fill="hold">
+                            <p:stCondLst>
+                              <p:cond delay="500"/>
+                            </p:stCondLst>
+                            <p:childTnLst>
+                              <p:par>
+                                <p:cTn id="99" presetID="14" presetClass="entr" presetSubtype="5" fill="hold" grpId="0" nodeType="afterEffect">
+                                  <p:stCondLst>
+                                    <p:cond delay="0"/>
+                                  </p:stCondLst>
+                                  <p:childTnLst>
+                                    <p:set>
+                                      <p:cBhvr>
+                                        <p:cTn id="100" dur="1" fill="hold">
+                                          <p:stCondLst>
+                                            <p:cond delay="0"/>
+                                          </p:stCondLst>
+                                        </p:cTn>
+                                        <p:tgtEl>
+                                          <p:spTgt spid="13"/>
+                                        </p:tgtEl>
+                                        <p:attrNameLst>
+                                          <p:attrName>style.visibility</p:attrName>
+                                        </p:attrNameLst>
+                                      </p:cBhvr>
+                                      <p:to>
+                                        <p:strVal val="visible"/>
+                                      </p:to>
+                                    </p:set>
+                                    <p:animEffect transition="in" filter="randombar(vertical)">
+                                      <p:cBhvr>
+                                        <p:cTn id="101" dur="500"/>
+                                        <p:tgtEl>
+                                          <p:spTgt spid="13"/>
+                                        </p:tgtEl>
+                                      </p:cBhvr>
+                                    </p:animEffect>
+                                  </p:childTnLst>
+                                </p:cTn>
+                              </p:par>
+                            </p:childTnLst>
+                          </p:cTn>
+                        </p:par>
+                      </p:childTnLst>
+                    </p:cTn>
+                  </p:par>
+                </p:childTnLst>
+              </p:cTn>
+              <p:prevCondLst>
+                <p:cond evt="onPrev" delay="0">
+                  <p:tgtEl>
+                    <p:sldTgt/>
+                  </p:tgtEl>
+                </p:cond>
+              </p:prevCondLst>
+              <p:nextCondLst>
+                <p:cond evt="onNext" delay="0">
+                  <p:tgtEl>
+                    <p:sldTgt/>
+                  </p:tgtEl>
+                </p:cond>
+              </p:nextCondLst>
+            </p:seq>
+          </p:childTnLst>
+        </p:cTn>
+      </p:par>
+    </p:tnLst>
+    <p:bldLst>
+      <p:bldP spid="2" grpId="0"/>
+      <p:bldP spid="4" grpId="0"/>
+      <p:bldP spid="5" grpId="0"/>
+      <p:bldP spid="7" grpId="0"/>
+      <p:bldP spid="8" grpId="0"/>
+      <p:bldP spid="9" grpId="0"/>
+      <p:bldP spid="10" grpId="0"/>
+      <p:bldP spid="11" grpId="0"/>
+      <p:bldP spid="12" grpId="0"/>
+      <p:bldP spid="13" grpId="0"/>
+      <p:bldP spid="39" grpId="0"/>
+      <p:bldP spid="39" grpId="1"/>
+    </p:bldLst>
+  </p:timing>
+</p:sld>
+</file>
+
+<file path=ppt/slides/slide2.xml><?xml version="1.0" encoding="utf-8"?>
+<p:sld xmlns:a="http://schemas.openxmlformats.org/drawingml/2006/main" xmlns:r="http://schemas.openxmlformats.org/officeDocument/2006/relationships" xmlns:p="http://schemas.openxmlformats.org/presentationml/2006/main">
+  <p:cSld>
+    <p:spTree>
+      <p:nvGrpSpPr>
+        <p:cNvPr id="1" name=""/>
+        <p:cNvGrpSpPr/>
+        <p:nvPr/>
+      </p:nvGrpSpPr>
+      <p:grpSpPr>
+        <a:xfrm>
+          <a:off x="0" y="0"/>
+          <a:ext cx="0" cy="0"/>
+          <a:chOff x="0" y="0"/>
+          <a:chExt cx="0" cy="0"/>
+        </a:xfrm>
+      </p:grpSpPr>
+      <p:pic>
+        <p:nvPicPr>
+          <p:cNvPr id="6" name="Picture 5"/>
+          <p:cNvPicPr>
+            <a:picLocks noChangeAspect="1"/>
+          </p:cNvPicPr>
+          <p:nvPr/>
+        </p:nvPicPr>
+        <p:blipFill>
+          <a:blip r:embed="rId2" cstate="print">
+            <a:extLst>
+              <a:ext uri="{28A0092B-C50C-407E-A947-70E740481C1C}">
+                <a14:useLocalDpi xmlns:a14="http://schemas.microsoft.com/office/drawing/2010/main" val="0"/>
+              </a:ext>
+            </a:extLst>
+          </a:blip>
+          <a:stretch>
+            <a:fillRect/>
+          </a:stretch>
+        </p:blipFill>
+        <p:spPr>
+          <a:xfrm>
+            <a:off x="2825578" y="1685956"/>
+            <a:ext cx="5832390" cy="3062713"/>
+          </a:xfrm>
+          <a:prstGeom prst="rect">
+            <a:avLst/>
+          </a:prstGeom>
+        </p:spPr>
+      </p:pic>
+      <p:sp>
+        <p:nvSpPr>
+          <p:cNvPr id="2" name="TextBox 1"/>
+          <p:cNvSpPr txBox="1"/>
+          <p:nvPr/>
+        </p:nvSpPr>
+        <p:spPr>
+          <a:xfrm>
+            <a:off x="2023793" y="845749"/>
+            <a:ext cx="1804468" cy="369332"/>
+          </a:xfrm>
+          <a:prstGeom prst="rect">
+            <a:avLst/>
+          </a:prstGeom>
+          <a:noFill/>
+        </p:spPr>
+        <p:txBody>
+          <a:bodyPr wrap="none" rtlCol="0">
+            <a:spAutoFit/>
+          </a:bodyPr>
+          <a:lstStyle/>
+          <a:p>
+            <a:r>
+              <a:rPr lang="en-GB" dirty="0" err="1" smtClean="0"/>
+              <a:t>Succint</a:t>
+            </a:r>
+            <a:r>
+              <a:rPr lang="en-GB" dirty="0" smtClean="0"/>
+              <a:t> Language</a:t>
+            </a:r>
+            <a:endParaRPr lang="en-GB" dirty="0"/>
+          </a:p>
+        </p:txBody>
+      </p:sp>
+      <p:sp>
+        <p:nvSpPr>
+          <p:cNvPr id="4" name="TextBox 3"/>
+          <p:cNvSpPr txBox="1"/>
+          <p:nvPr/>
+        </p:nvSpPr>
+        <p:spPr>
+          <a:xfrm>
+            <a:off x="4925644" y="845749"/>
+            <a:ext cx="1816203" cy="369332"/>
+          </a:xfrm>
+          <a:prstGeom prst="rect">
+            <a:avLst/>
+          </a:prstGeom>
+          <a:noFill/>
+        </p:spPr>
+        <p:txBody>
+          <a:bodyPr wrap="none" rtlCol="0">
+            <a:spAutoFit/>
+          </a:bodyPr>
+          <a:lstStyle/>
+          <a:p>
+            <a:r>
+              <a:rPr lang="en-GB" dirty="0" smtClean="0"/>
+              <a:t>Less lines of code</a:t>
+            </a:r>
+            <a:endParaRPr lang="en-GB" dirty="0"/>
+          </a:p>
+        </p:txBody>
+      </p:sp>
+      <p:sp>
+        <p:nvSpPr>
+          <p:cNvPr id="5" name="TextBox 4"/>
+          <p:cNvSpPr txBox="1"/>
+          <p:nvPr/>
+        </p:nvSpPr>
+        <p:spPr>
+          <a:xfrm>
+            <a:off x="7537452" y="844730"/>
+            <a:ext cx="1072730" cy="369332"/>
+          </a:xfrm>
+          <a:prstGeom prst="rect">
+            <a:avLst/>
+          </a:prstGeom>
+          <a:noFill/>
+        </p:spPr>
+        <p:txBody>
+          <a:bodyPr wrap="none" rtlCol="0">
+            <a:spAutoFit/>
+          </a:bodyPr>
+          <a:lstStyle/>
+          <a:p>
+            <a:r>
+              <a:rPr lang="en-GB" dirty="0" smtClean="0"/>
+              <a:t>Less bugs</a:t>
+            </a:r>
+            <a:endParaRPr lang="en-GB" dirty="0"/>
+          </a:p>
+        </p:txBody>
+      </p:sp>
+      <p:sp>
+        <p:nvSpPr>
+          <p:cNvPr id="7" name="TextBox 6"/>
+          <p:cNvSpPr txBox="1"/>
+          <p:nvPr/>
+        </p:nvSpPr>
+        <p:spPr>
+          <a:xfrm>
+            <a:off x="7537452" y="2515795"/>
+            <a:ext cx="2286716" cy="369332"/>
+          </a:xfrm>
+          <a:prstGeom prst="rect">
+            <a:avLst/>
+          </a:prstGeom>
+          <a:noFill/>
+        </p:spPr>
+        <p:txBody>
+          <a:bodyPr wrap="none" rtlCol="0">
+            <a:spAutoFit/>
+          </a:bodyPr>
+          <a:lstStyle/>
+          <a:p>
+            <a:r>
+              <a:rPr lang="en-GB" dirty="0" smtClean="0"/>
+              <a:t>Easier to reason about</a:t>
+            </a:r>
+            <a:endParaRPr lang="en-GB" dirty="0"/>
+          </a:p>
+        </p:txBody>
+      </p:sp>
+      <p:sp>
+        <p:nvSpPr>
+          <p:cNvPr id="8" name="TextBox 7"/>
+          <p:cNvSpPr txBox="1"/>
+          <p:nvPr/>
+        </p:nvSpPr>
+        <p:spPr>
+          <a:xfrm>
+            <a:off x="7537452" y="3714966"/>
+            <a:ext cx="1585370" cy="369332"/>
+          </a:xfrm>
+          <a:prstGeom prst="rect">
+            <a:avLst/>
+          </a:prstGeom>
+          <a:noFill/>
+        </p:spPr>
+        <p:txBody>
+          <a:bodyPr wrap="none" rtlCol="0">
+            <a:spAutoFit/>
+          </a:bodyPr>
+          <a:lstStyle/>
+          <a:p>
+            <a:r>
+              <a:rPr lang="en-GB" dirty="0" smtClean="0"/>
+              <a:t>Less cruft code</a:t>
+            </a:r>
+            <a:endParaRPr lang="en-GB" dirty="0"/>
+          </a:p>
+        </p:txBody>
+      </p:sp>
+      <p:sp>
+        <p:nvSpPr>
+          <p:cNvPr id="9" name="TextBox 8"/>
+          <p:cNvSpPr txBox="1"/>
+          <p:nvPr/>
+        </p:nvSpPr>
+        <p:spPr>
+          <a:xfrm>
+            <a:off x="7537452" y="5235686"/>
+            <a:ext cx="1205779" cy="369332"/>
+          </a:xfrm>
+          <a:prstGeom prst="rect">
+            <a:avLst/>
+          </a:prstGeom>
+          <a:noFill/>
+        </p:spPr>
+        <p:txBody>
+          <a:bodyPr wrap="none" rtlCol="0">
+            <a:spAutoFit/>
+          </a:bodyPr>
+          <a:lstStyle/>
+          <a:p>
+            <a:r>
+              <a:rPr lang="en-GB" dirty="0" smtClean="0"/>
+              <a:t>F# Console</a:t>
+            </a:r>
+            <a:endParaRPr lang="en-GB" dirty="0"/>
+          </a:p>
+        </p:txBody>
+      </p:sp>
+      <p:sp>
+        <p:nvSpPr>
+          <p:cNvPr id="10" name="TextBox 9"/>
+          <p:cNvSpPr txBox="1"/>
+          <p:nvPr/>
+        </p:nvSpPr>
+        <p:spPr>
+          <a:xfrm>
+            <a:off x="4889969" y="5238749"/>
+            <a:ext cx="1735219" cy="369332"/>
+          </a:xfrm>
+          <a:prstGeom prst="rect">
+            <a:avLst/>
+          </a:prstGeom>
+          <a:noFill/>
+        </p:spPr>
+        <p:txBody>
+          <a:bodyPr wrap="none" rtlCol="0">
+            <a:spAutoFit/>
+          </a:bodyPr>
+          <a:lstStyle/>
+          <a:p>
+            <a:r>
+              <a:rPr lang="en-GB" dirty="0" smtClean="0"/>
+              <a:t>Native access C#</a:t>
+            </a:r>
+          </a:p>
+        </p:txBody>
+      </p:sp>
+      <p:sp>
+        <p:nvSpPr>
+          <p:cNvPr id="11" name="TextBox 10"/>
+          <p:cNvSpPr txBox="1"/>
+          <p:nvPr/>
+        </p:nvSpPr>
+        <p:spPr>
+          <a:xfrm>
+            <a:off x="2460386" y="5235686"/>
+            <a:ext cx="1367875" cy="369332"/>
+          </a:xfrm>
+          <a:prstGeom prst="rect">
+            <a:avLst/>
+          </a:prstGeom>
+          <a:noFill/>
+        </p:spPr>
+        <p:txBody>
+          <a:bodyPr wrap="none" rtlCol="0">
+            <a:spAutoFit/>
+          </a:bodyPr>
+          <a:lstStyle/>
+          <a:p>
+            <a:r>
+              <a:rPr lang="en-GB" dirty="0" smtClean="0"/>
+              <a:t>Concurrency</a:t>
+            </a:r>
+            <a:endParaRPr lang="en-GB" dirty="0"/>
+          </a:p>
+        </p:txBody>
+      </p:sp>
+      <p:sp>
+        <p:nvSpPr>
+          <p:cNvPr id="12" name="TextBox 11"/>
+          <p:cNvSpPr txBox="1"/>
+          <p:nvPr/>
+        </p:nvSpPr>
+        <p:spPr>
+          <a:xfrm>
+            <a:off x="2029179" y="3714966"/>
+            <a:ext cx="1799082" cy="369332"/>
+          </a:xfrm>
+          <a:prstGeom prst="rect">
+            <a:avLst/>
+          </a:prstGeom>
+          <a:noFill/>
+        </p:spPr>
+        <p:txBody>
+          <a:bodyPr wrap="none" rtlCol="0">
+            <a:spAutoFit/>
+          </a:bodyPr>
+          <a:lstStyle/>
+          <a:p>
+            <a:r>
+              <a:rPr lang="en-GB" dirty="0" smtClean="0"/>
+              <a:t>Units of Measure</a:t>
+            </a:r>
+            <a:endParaRPr lang="en-GB" dirty="0"/>
+          </a:p>
+        </p:txBody>
+      </p:sp>
+      <p:sp>
+        <p:nvSpPr>
+          <p:cNvPr id="13" name="TextBox 12"/>
+          <p:cNvSpPr txBox="1"/>
+          <p:nvPr/>
+        </p:nvSpPr>
+        <p:spPr>
+          <a:xfrm>
+            <a:off x="2019881" y="2509806"/>
+            <a:ext cx="1808380" cy="369332"/>
+          </a:xfrm>
+          <a:prstGeom prst="rect">
+            <a:avLst/>
+          </a:prstGeom>
+          <a:noFill/>
+        </p:spPr>
+        <p:txBody>
+          <a:bodyPr wrap="none" rtlCol="0">
+            <a:spAutoFit/>
+          </a:bodyPr>
+          <a:lstStyle/>
+          <a:p>
+            <a:r>
+              <a:rPr lang="en-GB" dirty="0" smtClean="0"/>
+              <a:t>Pattern Matching</a:t>
+            </a:r>
+            <a:endParaRPr lang="en-GB" dirty="0"/>
+          </a:p>
+        </p:txBody>
+      </p:sp>
+      <p:cxnSp>
+        <p:nvCxnSpPr>
+          <p:cNvPr id="14" name="Straight Arrow Connector 13"/>
+          <p:cNvCxnSpPr>
+            <a:endCxn id="2" idx="2"/>
+          </p:cNvCxnSpPr>
+          <p:nvPr/>
+        </p:nvCxnSpPr>
+        <p:spPr>
+          <a:xfrm flipH="1" flipV="1">
+            <a:off x="2926027" y="1215081"/>
+            <a:ext cx="1711888" cy="985378"/>
+          </a:xfrm>
+          <a:prstGeom prst="straightConnector1">
+            <a:avLst/>
+          </a:prstGeom>
+          <a:ln w="38100">
+            <a:tailEnd type="triangle"/>
+          </a:ln>
+        </p:spPr>
+        <p:style>
+          <a:lnRef idx="1">
+            <a:schemeClr val="accent1"/>
+          </a:lnRef>
+          <a:fillRef idx="0">
+            <a:schemeClr val="accent1"/>
+          </a:fillRef>
+          <a:effectRef idx="0">
+            <a:schemeClr val="accent1"/>
+          </a:effectRef>
+          <a:fontRef idx="minor">
+            <a:schemeClr val="tx1"/>
+          </a:fontRef>
+        </p:style>
+      </p:cxnSp>
+      <p:cxnSp>
+        <p:nvCxnSpPr>
+          <p:cNvPr id="15" name="Straight Arrow Connector 14"/>
+          <p:cNvCxnSpPr>
+            <a:stCxn id="2" idx="3"/>
+            <a:endCxn id="4" idx="1"/>
+          </p:cNvCxnSpPr>
+          <p:nvPr/>
+        </p:nvCxnSpPr>
+        <p:spPr>
+          <a:xfrm>
+            <a:off x="3828261" y="1030415"/>
+            <a:ext cx="1097383" cy="0"/>
+          </a:xfrm>
+          <a:prstGeom prst="straightConnector1">
+            <a:avLst/>
+          </a:prstGeom>
+          <a:ln w="38100">
+            <a:tailEnd type="triangle"/>
+          </a:ln>
+        </p:spPr>
+        <p:style>
+          <a:lnRef idx="1">
+            <a:schemeClr val="accent1"/>
+          </a:lnRef>
+          <a:fillRef idx="0">
+            <a:schemeClr val="accent1"/>
+          </a:fillRef>
+          <a:effectRef idx="0">
+            <a:schemeClr val="accent1"/>
+          </a:effectRef>
+          <a:fontRef idx="minor">
+            <a:schemeClr val="tx1"/>
+          </a:fontRef>
+        </p:style>
+      </p:cxnSp>
+      <p:cxnSp>
+        <p:nvCxnSpPr>
+          <p:cNvPr id="21" name="Straight Arrow Connector 20"/>
+          <p:cNvCxnSpPr>
+            <a:stCxn id="10" idx="0"/>
+          </p:cNvCxnSpPr>
+          <p:nvPr/>
+        </p:nvCxnSpPr>
+        <p:spPr>
+          <a:xfrm flipH="1" flipV="1">
+            <a:off x="5757578" y="4319690"/>
+            <a:ext cx="1" cy="919059"/>
+          </a:xfrm>
+          <a:prstGeom prst="straightConnector1">
+            <a:avLst/>
+          </a:prstGeom>
+          <a:ln w="38100">
+            <a:headEnd type="triangle" w="med" len="med"/>
+            <a:tailEnd type="none" w="med" len="med"/>
+          </a:ln>
+        </p:spPr>
+        <p:style>
+          <a:lnRef idx="1">
+            <a:schemeClr val="accent1"/>
+          </a:lnRef>
+          <a:fillRef idx="0">
+            <a:schemeClr val="accent1"/>
+          </a:fillRef>
+          <a:effectRef idx="0">
+            <a:schemeClr val="accent1"/>
+          </a:effectRef>
+          <a:fontRef idx="minor">
+            <a:schemeClr val="tx1"/>
+          </a:fontRef>
+        </p:style>
+      </p:cxnSp>
+      <p:cxnSp>
+        <p:nvCxnSpPr>
+          <p:cNvPr id="22" name="Straight Arrow Connector 21"/>
+          <p:cNvCxnSpPr>
+            <a:stCxn id="4" idx="3"/>
+            <a:endCxn id="5" idx="1"/>
+          </p:cNvCxnSpPr>
+          <p:nvPr/>
+        </p:nvCxnSpPr>
+        <p:spPr>
+          <a:xfrm flipV="1">
+            <a:off x="6741847" y="1029396"/>
+            <a:ext cx="795605" cy="1019"/>
+          </a:xfrm>
+          <a:prstGeom prst="straightConnector1">
+            <a:avLst/>
+          </a:prstGeom>
+          <a:ln w="38100">
+            <a:tailEnd type="triangle"/>
+          </a:ln>
+        </p:spPr>
+        <p:style>
+          <a:lnRef idx="1">
+            <a:schemeClr val="accent1"/>
+          </a:lnRef>
+          <a:fillRef idx="0">
+            <a:schemeClr val="accent1"/>
+          </a:fillRef>
+          <a:effectRef idx="0">
+            <a:schemeClr val="accent1"/>
+          </a:effectRef>
+          <a:fontRef idx="minor">
+            <a:schemeClr val="tx1"/>
+          </a:fontRef>
+        </p:style>
+      </p:cxnSp>
+      <p:cxnSp>
+        <p:nvCxnSpPr>
+          <p:cNvPr id="27" name="Straight Arrow Connector 26"/>
+          <p:cNvCxnSpPr/>
+          <p:nvPr/>
+        </p:nvCxnSpPr>
+        <p:spPr>
+          <a:xfrm>
+            <a:off x="6829168" y="2700461"/>
+            <a:ext cx="708284" cy="0"/>
+          </a:xfrm>
+          <a:prstGeom prst="straightConnector1">
+            <a:avLst/>
+          </a:prstGeom>
+          <a:ln w="38100">
+            <a:tailEnd type="triangle"/>
+          </a:ln>
+        </p:spPr>
+        <p:style>
+          <a:lnRef idx="1">
+            <a:schemeClr val="accent1"/>
+          </a:lnRef>
+          <a:fillRef idx="0">
+            <a:schemeClr val="accent1"/>
+          </a:fillRef>
+          <a:effectRef idx="0">
+            <a:schemeClr val="accent1"/>
+          </a:effectRef>
+          <a:fontRef idx="minor">
+            <a:schemeClr val="tx1"/>
+          </a:fontRef>
+        </p:style>
+      </p:cxnSp>
+      <p:cxnSp>
+        <p:nvCxnSpPr>
+          <p:cNvPr id="30" name="Straight Arrow Connector 29"/>
+          <p:cNvCxnSpPr/>
+          <p:nvPr/>
+        </p:nvCxnSpPr>
+        <p:spPr>
+          <a:xfrm>
+            <a:off x="6829168" y="3899632"/>
+            <a:ext cx="708284" cy="0"/>
+          </a:xfrm>
+          <a:prstGeom prst="straightConnector1">
+            <a:avLst/>
+          </a:prstGeom>
+          <a:ln w="38100">
+            <a:tailEnd type="triangle"/>
+          </a:ln>
+        </p:spPr>
+        <p:style>
+          <a:lnRef idx="1">
+            <a:schemeClr val="accent1"/>
+          </a:lnRef>
+          <a:fillRef idx="0">
+            <a:schemeClr val="accent1"/>
+          </a:fillRef>
+          <a:effectRef idx="0">
+            <a:schemeClr val="accent1"/>
+          </a:effectRef>
+          <a:fontRef idx="minor">
+            <a:schemeClr val="tx1"/>
+          </a:fontRef>
+        </p:style>
+      </p:cxnSp>
+      <p:cxnSp>
+        <p:nvCxnSpPr>
+          <p:cNvPr id="31" name="Straight Arrow Connector 30"/>
+          <p:cNvCxnSpPr/>
+          <p:nvPr/>
+        </p:nvCxnSpPr>
+        <p:spPr>
+          <a:xfrm>
+            <a:off x="3929620" y="2694792"/>
+            <a:ext cx="708284" cy="0"/>
+          </a:xfrm>
+          <a:prstGeom prst="straightConnector1">
+            <a:avLst/>
+          </a:prstGeom>
+          <a:ln w="38100">
+            <a:headEnd type="triangle" w="med" len="med"/>
+            <a:tailEnd type="none" w="med" len="med"/>
+          </a:ln>
+        </p:spPr>
+        <p:style>
+          <a:lnRef idx="1">
+            <a:schemeClr val="accent1"/>
+          </a:lnRef>
+          <a:fillRef idx="0">
+            <a:schemeClr val="accent1"/>
+          </a:fillRef>
+          <a:effectRef idx="0">
+            <a:schemeClr val="accent1"/>
+          </a:effectRef>
+          <a:fontRef idx="minor">
+            <a:schemeClr val="tx1"/>
+          </a:fontRef>
+        </p:style>
+      </p:cxnSp>
+      <p:cxnSp>
+        <p:nvCxnSpPr>
+          <p:cNvPr id="32" name="Straight Arrow Connector 31"/>
+          <p:cNvCxnSpPr/>
+          <p:nvPr/>
+        </p:nvCxnSpPr>
+        <p:spPr>
+          <a:xfrm>
+            <a:off x="3929620" y="3893963"/>
+            <a:ext cx="708284" cy="0"/>
+          </a:xfrm>
+          <a:prstGeom prst="straightConnector1">
+            <a:avLst/>
+          </a:prstGeom>
+          <a:ln w="38100">
+            <a:headEnd type="triangle" w="med" len="med"/>
+            <a:tailEnd type="none" w="med" len="med"/>
+          </a:ln>
+        </p:spPr>
+        <p:style>
+          <a:lnRef idx="1">
+            <a:schemeClr val="accent1"/>
+          </a:lnRef>
+          <a:fillRef idx="0">
+            <a:schemeClr val="accent1"/>
+          </a:fillRef>
+          <a:effectRef idx="0">
+            <a:schemeClr val="accent1"/>
+          </a:effectRef>
+          <a:fontRef idx="minor">
+            <a:schemeClr val="tx1"/>
+          </a:fontRef>
+        </p:style>
+      </p:cxnSp>
+      <p:cxnSp>
+        <p:nvCxnSpPr>
+          <p:cNvPr id="33" name="Straight Arrow Connector 32"/>
+          <p:cNvCxnSpPr/>
+          <p:nvPr/>
+        </p:nvCxnSpPr>
+        <p:spPr>
+          <a:xfrm flipH="1" flipV="1">
+            <a:off x="6768642" y="4255980"/>
+            <a:ext cx="1408910" cy="985377"/>
+          </a:xfrm>
+          <a:prstGeom prst="straightConnector1">
+            <a:avLst/>
+          </a:prstGeom>
+          <a:ln w="38100">
+            <a:headEnd type="triangle" w="med" len="med"/>
+            <a:tailEnd type="none" w="med" len="med"/>
+          </a:ln>
+        </p:spPr>
+        <p:style>
+          <a:lnRef idx="1">
+            <a:schemeClr val="accent1"/>
+          </a:lnRef>
+          <a:fillRef idx="0">
+            <a:schemeClr val="accent1"/>
+          </a:fillRef>
+          <a:effectRef idx="0">
+            <a:schemeClr val="accent1"/>
+          </a:effectRef>
+          <a:fontRef idx="minor">
+            <a:schemeClr val="tx1"/>
+          </a:fontRef>
+        </p:style>
+      </p:cxnSp>
+      <p:cxnSp>
+        <p:nvCxnSpPr>
+          <p:cNvPr id="34" name="Straight Arrow Connector 33"/>
+          <p:cNvCxnSpPr>
+            <a:stCxn id="11" idx="0"/>
+          </p:cNvCxnSpPr>
+          <p:nvPr/>
+        </p:nvCxnSpPr>
+        <p:spPr>
+          <a:xfrm flipV="1">
+            <a:off x="3144324" y="4255980"/>
+            <a:ext cx="1493580" cy="979706"/>
+          </a:xfrm>
+          <a:prstGeom prst="straightConnector1">
+            <a:avLst/>
+          </a:prstGeom>
+          <a:ln w="38100">
+            <a:headEnd type="triangle" w="med" len="med"/>
+            <a:tailEnd type="none" w="med" len="med"/>
+          </a:ln>
+        </p:spPr>
+        <p:style>
+          <a:lnRef idx="1">
+            <a:schemeClr val="accent1"/>
+          </a:lnRef>
+          <a:fillRef idx="0">
+            <a:schemeClr val="accent1"/>
+          </a:fillRef>
+          <a:effectRef idx="0">
+            <a:schemeClr val="accent1"/>
+          </a:effectRef>
+          <a:fontRef idx="minor">
+            <a:schemeClr val="tx1"/>
+          </a:fontRef>
+        </p:style>
+      </p:cxnSp>
+      <p:sp>
+        <p:nvSpPr>
+          <p:cNvPr id="29" name="TextBox 28"/>
+          <p:cNvSpPr txBox="1"/>
+          <p:nvPr/>
+        </p:nvSpPr>
+        <p:spPr>
+          <a:xfrm>
+            <a:off x="4873586" y="1188130"/>
+            <a:ext cx="1736373" cy="830997"/>
+          </a:xfrm>
+          <a:prstGeom prst="rect">
+            <a:avLst/>
+          </a:prstGeom>
+          <a:noFill/>
+        </p:spPr>
+        <p:txBody>
+          <a:bodyPr wrap="none" rtlCol="0">
+            <a:spAutoFit/>
+          </a:bodyPr>
+          <a:lstStyle/>
+          <a:p>
+            <a:r>
+              <a:rPr lang="en-GB" sz="4800" b="1" dirty="0" smtClean="0">
+                <a:solidFill>
+                  <a:srgbClr val="FF0000"/>
+                </a:solidFill>
+              </a:rPr>
+              <a:t>WHY?</a:t>
+            </a:r>
+            <a:endParaRPr lang="en-GB" sz="4800" b="1" dirty="0">
+              <a:solidFill>
+                <a:srgbClr val="FF0000"/>
+              </a:solidFill>
+            </a:endParaRPr>
+          </a:p>
+        </p:txBody>
+      </p:sp>
+    </p:spTree>
+    <p:extLst>
+      <p:ext uri="{BB962C8B-B14F-4D97-AF65-F5344CB8AC3E}">
+        <p14:creationId xmlns:p14="http://schemas.microsoft.com/office/powerpoint/2010/main" val="351923836"/>
+      </p:ext>
+    </p:extLst>
+  </p:cSld>
+  <p:clrMapOvr>
+    <a:masterClrMapping/>
+  </p:clrMapOvr>
+  <p:timing>
+    <p:tnLst>
+      <p:par>
+        <p:cTn id="1" dur="indefinite" restart="never" nodeType="tmRoot">
+          <p:childTnLst>
+            <p:seq concurrent="1" nextAc="seek">
+              <p:cTn id="2" dur="indefinite" nodeType="mainSeq">
+                <p:childTnLst>
+                  <p:par>
+                    <p:cTn id="3" fill="hold">
+                      <p:stCondLst>
+                        <p:cond delay="indefinite"/>
+                      </p:stCondLst>
+                      <p:childTnLst>
+                        <p:par>
+                          <p:cTn id="4" fill="hold">
+                            <p:stCondLst>
+                              <p:cond delay="0"/>
+                            </p:stCondLst>
+                            <p:childTnLst>
+                              <p:par>
+                                <p:cTn id="5" presetID="26" presetClass="emph" presetSubtype="0" fill="hold" grpId="2" nodeType="clickEffect">
+                                  <p:stCondLst>
+                                    <p:cond delay="0"/>
+                                  </p:stCondLst>
+                                  <p:childTnLst>
+                                    <p:animEffect transition="out" filter="fade">
+                                      <p:cBhvr>
+                                        <p:cTn id="6" dur="500" tmFilter="0, 0; .2, .5; .8, .5; 1, 0"/>
+                                        <p:tgtEl>
+                                          <p:spTgt spid="29"/>
+                                        </p:tgtEl>
+                                      </p:cBhvr>
+                                    </p:animEffect>
+                                    <p:animScale>
+                                      <p:cBhvr>
+                                        <p:cTn id="7" dur="250" autoRev="1" fill="hold"/>
+                                        <p:tgtEl>
+                                          <p:spTgt spid="29"/>
+                                        </p:tgtEl>
+                                      </p:cBhvr>
+                                      <p:by x="105000" y="105000"/>
+                                    </p:animScale>
+                                  </p:childTnLst>
+                                </p:cTn>
+                              </p:par>
+                            </p:childTnLst>
+                          </p:cTn>
+                        </p:par>
+                      </p:childTnLst>
+                    </p:cTn>
+                  </p:par>
+                  <p:par>
+                    <p:cTn id="8" fill="hold">
+                      <p:stCondLst>
+                        <p:cond delay="indefinite"/>
+                      </p:stCondLst>
+                      <p:childTnLst>
+                        <p:par>
+                          <p:cTn id="9" fill="hold">
+                            <p:stCondLst>
+                              <p:cond delay="0"/>
+                            </p:stCondLst>
+                            <p:childTnLst>
+                              <p:par>
+                                <p:cTn id="10" presetID="22" presetClass="exit" presetSubtype="4" fill="hold" grpId="1" nodeType="clickEffect">
+                                  <p:stCondLst>
+                                    <p:cond delay="0"/>
+                                  </p:stCondLst>
+                                  <p:childTnLst>
+                                    <p:animEffect transition="out" filter="wipe(down)">
+                                      <p:cBhvr>
+                                        <p:cTn id="11" dur="500"/>
+                                        <p:tgtEl>
+                                          <p:spTgt spid="29"/>
+                                        </p:tgtEl>
+                                      </p:cBhvr>
+                                    </p:animEffect>
+                                    <p:set>
+                                      <p:cBhvr>
+                                        <p:cTn id="12" dur="1" fill="hold">
+                                          <p:stCondLst>
+                                            <p:cond delay="499"/>
+                                          </p:stCondLst>
+                                        </p:cTn>
+                                        <p:tgtEl>
+                                          <p:spTgt spid="29"/>
+                                        </p:tgtEl>
+                                        <p:attrNameLst>
+                                          <p:attrName>style.visibility</p:attrName>
+                                        </p:attrNameLst>
+                                      </p:cBhvr>
+                                      <p:to>
+                                        <p:strVal val="hidden"/>
+                                      </p:to>
+                                    </p:set>
+                                  </p:childTnLst>
+                                </p:cTn>
+                              </p:par>
+                            </p:childTnLst>
+                          </p:cTn>
+                        </p:par>
+                        <p:par>
+                          <p:cTn id="13" fill="hold">
+                            <p:stCondLst>
+                              <p:cond delay="500"/>
+                            </p:stCondLst>
+                            <p:childTnLst>
+                              <p:par>
+                                <p:cTn id="14" presetID="14" presetClass="entr" presetSubtype="10" fill="hold" nodeType="afterEffect">
+                                  <p:stCondLst>
+                                    <p:cond delay="0"/>
+                                  </p:stCondLst>
+                                  <p:childTnLst>
+                                    <p:set>
+                                      <p:cBhvr>
+                                        <p:cTn id="15" dur="1" fill="hold">
+                                          <p:stCondLst>
+                                            <p:cond delay="0"/>
+                                          </p:stCondLst>
+                                        </p:cTn>
+                                        <p:tgtEl>
+                                          <p:spTgt spid="14"/>
+                                        </p:tgtEl>
+                                        <p:attrNameLst>
+                                          <p:attrName>style.visibility</p:attrName>
+                                        </p:attrNameLst>
+                                      </p:cBhvr>
+                                      <p:to>
+                                        <p:strVal val="visible"/>
+                                      </p:to>
+                                    </p:set>
+                                    <p:animEffect transition="in" filter="randombar(horizontal)">
+                                      <p:cBhvr>
+                                        <p:cTn id="16" dur="500"/>
+                                        <p:tgtEl>
+                                          <p:spTgt spid="14"/>
+                                        </p:tgtEl>
+                                      </p:cBhvr>
+                                    </p:animEffect>
+                                  </p:childTnLst>
+                                </p:cTn>
+                              </p:par>
+                            </p:childTnLst>
+                          </p:cTn>
+                        </p:par>
+                        <p:par>
+                          <p:cTn id="17" fill="hold">
+                            <p:stCondLst>
+                              <p:cond delay="1000"/>
+                            </p:stCondLst>
+                            <p:childTnLst>
+                              <p:par>
+                                <p:cTn id="18" presetID="14" presetClass="entr" presetSubtype="10" fill="hold" grpId="0" nodeType="afterEffect">
+                                  <p:stCondLst>
+                                    <p:cond delay="0"/>
+                                  </p:stCondLst>
+                                  <p:childTnLst>
+                                    <p:set>
+                                      <p:cBhvr>
+                                        <p:cTn id="19" dur="1" fill="hold">
+                                          <p:stCondLst>
+                                            <p:cond delay="0"/>
+                                          </p:stCondLst>
+                                        </p:cTn>
+                                        <p:tgtEl>
+                                          <p:spTgt spid="2"/>
+                                        </p:tgtEl>
+                                        <p:attrNameLst>
+                                          <p:attrName>style.visibility</p:attrName>
+                                        </p:attrNameLst>
+                                      </p:cBhvr>
+                                      <p:to>
+                                        <p:strVal val="visible"/>
+                                      </p:to>
+                                    </p:set>
+                                    <p:animEffect transition="in" filter="randombar(horizontal)">
+                                      <p:cBhvr>
+                                        <p:cTn id="20" dur="500"/>
+                                        <p:tgtEl>
+                                          <p:spTgt spid="2"/>
+                                        </p:tgtEl>
+                                      </p:cBhvr>
+                                    </p:animEffect>
+                                  </p:childTnLst>
+                                </p:cTn>
+                              </p:par>
+                            </p:childTnLst>
+                          </p:cTn>
+                        </p:par>
+                      </p:childTnLst>
+                    </p:cTn>
+                  </p:par>
+                  <p:par>
+                    <p:cTn id="21" fill="hold">
+                      <p:stCondLst>
+                        <p:cond delay="indefinite"/>
+                      </p:stCondLst>
+                      <p:childTnLst>
+                        <p:par>
+                          <p:cTn id="22" fill="hold">
+                            <p:stCondLst>
+                              <p:cond delay="0"/>
+                            </p:stCondLst>
+                            <p:childTnLst>
+                              <p:par>
+                                <p:cTn id="23" presetID="14" presetClass="entr" presetSubtype="10" fill="hold" nodeType="clickEffect">
+                                  <p:stCondLst>
+                                    <p:cond delay="0"/>
+                                  </p:stCondLst>
+                                  <p:childTnLst>
+                                    <p:set>
+                                      <p:cBhvr>
+                                        <p:cTn id="24" dur="1" fill="hold">
+                                          <p:stCondLst>
+                                            <p:cond delay="0"/>
+                                          </p:stCondLst>
+                                        </p:cTn>
+                                        <p:tgtEl>
+                                          <p:spTgt spid="15"/>
+                                        </p:tgtEl>
+                                        <p:attrNameLst>
+                                          <p:attrName>style.visibility</p:attrName>
+                                        </p:attrNameLst>
+                                      </p:cBhvr>
+                                      <p:to>
+                                        <p:strVal val="visible"/>
+                                      </p:to>
+                                    </p:set>
+                                    <p:animEffect transition="in" filter="randombar(horizontal)">
+                                      <p:cBhvr>
+                                        <p:cTn id="25" dur="500"/>
+                                        <p:tgtEl>
+                                          <p:spTgt spid="15"/>
+                                        </p:tgtEl>
+                                      </p:cBhvr>
+                                    </p:animEffect>
+                                  </p:childTnLst>
+                                </p:cTn>
+                              </p:par>
+                            </p:childTnLst>
+                          </p:cTn>
+                        </p:par>
+                        <p:par>
+                          <p:cTn id="26" fill="hold">
+                            <p:stCondLst>
+                              <p:cond delay="500"/>
+                            </p:stCondLst>
+                            <p:childTnLst>
+                              <p:par>
+                                <p:cTn id="27" presetID="14" presetClass="entr" presetSubtype="10" fill="hold" grpId="0" nodeType="afterEffect">
+                                  <p:stCondLst>
+                                    <p:cond delay="0"/>
+                                  </p:stCondLst>
+                                  <p:childTnLst>
+                                    <p:set>
+                                      <p:cBhvr>
+                                        <p:cTn id="28" dur="1" fill="hold">
+                                          <p:stCondLst>
+                                            <p:cond delay="0"/>
+                                          </p:stCondLst>
+                                        </p:cTn>
+                                        <p:tgtEl>
+                                          <p:spTgt spid="4"/>
+                                        </p:tgtEl>
+                                        <p:attrNameLst>
+                                          <p:attrName>style.visibility</p:attrName>
+                                        </p:attrNameLst>
+                                      </p:cBhvr>
+                                      <p:to>
+                                        <p:strVal val="visible"/>
+                                      </p:to>
+                                    </p:set>
+                                    <p:animEffect transition="in" filter="randombar(horizontal)">
+                                      <p:cBhvr>
+                                        <p:cTn id="29" dur="500"/>
+                                        <p:tgtEl>
+                                          <p:spTgt spid="4"/>
+                                        </p:tgtEl>
+                                      </p:cBhvr>
+                                    </p:animEffect>
+                                  </p:childTnLst>
+                                </p:cTn>
+                              </p:par>
+                            </p:childTnLst>
+                          </p:cTn>
+                        </p:par>
+                      </p:childTnLst>
+                    </p:cTn>
+                  </p:par>
+                  <p:par>
+                    <p:cTn id="30" fill="hold">
+                      <p:stCondLst>
+                        <p:cond delay="indefinite"/>
+                      </p:stCondLst>
+                      <p:childTnLst>
+                        <p:par>
+                          <p:cTn id="31" fill="hold">
+                            <p:stCondLst>
+                              <p:cond delay="0"/>
+                            </p:stCondLst>
+                            <p:childTnLst>
+                              <p:par>
+                                <p:cTn id="32" presetID="14" presetClass="entr" presetSubtype="10" fill="hold" nodeType="clickEffect">
+                                  <p:stCondLst>
+                                    <p:cond delay="0"/>
+                                  </p:stCondLst>
+                                  <p:childTnLst>
+                                    <p:set>
+                                      <p:cBhvr>
+                                        <p:cTn id="33" dur="1" fill="hold">
+                                          <p:stCondLst>
+                                            <p:cond delay="0"/>
+                                          </p:stCondLst>
+                                        </p:cTn>
+                                        <p:tgtEl>
+                                          <p:spTgt spid="22"/>
+                                        </p:tgtEl>
+                                        <p:attrNameLst>
+                                          <p:attrName>style.visibility</p:attrName>
+                                        </p:attrNameLst>
+                                      </p:cBhvr>
+                                      <p:to>
+                                        <p:strVal val="visible"/>
+                                      </p:to>
+                                    </p:set>
+                                    <p:animEffect transition="in" filter="randombar(horizontal)">
+                                      <p:cBhvr>
+                                        <p:cTn id="34" dur="500"/>
+                                        <p:tgtEl>
+                                          <p:spTgt spid="22"/>
+                                        </p:tgtEl>
+                                      </p:cBhvr>
+                                    </p:animEffect>
+                                  </p:childTnLst>
+                                </p:cTn>
+                              </p:par>
+                            </p:childTnLst>
+                          </p:cTn>
+                        </p:par>
+                        <p:par>
+                          <p:cTn id="35" fill="hold">
+                            <p:stCondLst>
+                              <p:cond delay="500"/>
+                            </p:stCondLst>
+                            <p:childTnLst>
+                              <p:par>
+                                <p:cTn id="36" presetID="14" presetClass="entr" presetSubtype="10" fill="hold" grpId="0" nodeType="afterEffect">
+                                  <p:stCondLst>
+                                    <p:cond delay="0"/>
+                                  </p:stCondLst>
+                                  <p:childTnLst>
+                                    <p:set>
+                                      <p:cBhvr>
+                                        <p:cTn id="37" dur="1" fill="hold">
+                                          <p:stCondLst>
+                                            <p:cond delay="0"/>
+                                          </p:stCondLst>
+                                        </p:cTn>
+                                        <p:tgtEl>
+                                          <p:spTgt spid="5"/>
+                                        </p:tgtEl>
+                                        <p:attrNameLst>
+                                          <p:attrName>style.visibility</p:attrName>
+                                        </p:attrNameLst>
+                                      </p:cBhvr>
+                                      <p:to>
+                                        <p:strVal val="visible"/>
+                                      </p:to>
+                                    </p:set>
+                                    <p:animEffect transition="in" filter="randombar(horizontal)">
+                                      <p:cBhvr>
+                                        <p:cTn id="38" dur="500"/>
+                                        <p:tgtEl>
+                                          <p:spTgt spid="5"/>
+                                        </p:tgtEl>
+                                      </p:cBhvr>
+                                    </p:animEffect>
+                                  </p:childTnLst>
+                                </p:cTn>
+                              </p:par>
+                            </p:childTnLst>
+                          </p:cTn>
+                        </p:par>
+                      </p:childTnLst>
+                    </p:cTn>
+                  </p:par>
+                  <p:par>
+                    <p:cTn id="39" fill="hold">
+                      <p:stCondLst>
+                        <p:cond delay="indefinite"/>
+                      </p:stCondLst>
+                      <p:childTnLst>
+                        <p:par>
+                          <p:cTn id="40" fill="hold">
+                            <p:stCondLst>
+                              <p:cond delay="0"/>
+                            </p:stCondLst>
+                            <p:childTnLst>
+                              <p:par>
+                                <p:cTn id="41" presetID="14" presetClass="entr" presetSubtype="5" fill="hold" nodeType="clickEffect">
+                                  <p:stCondLst>
+                                    <p:cond delay="0"/>
+                                  </p:stCondLst>
+                                  <p:childTnLst>
+                                    <p:set>
+                                      <p:cBhvr>
+                                        <p:cTn id="42" dur="1" fill="hold">
+                                          <p:stCondLst>
+                                            <p:cond delay="0"/>
+                                          </p:stCondLst>
+                                        </p:cTn>
+                                        <p:tgtEl>
+                                          <p:spTgt spid="27"/>
+                                        </p:tgtEl>
+                                        <p:attrNameLst>
+                                          <p:attrName>style.visibility</p:attrName>
+                                        </p:attrNameLst>
+                                      </p:cBhvr>
+                                      <p:to>
+                                        <p:strVal val="visible"/>
+                                      </p:to>
+                                    </p:set>
+                                    <p:animEffect transition="in" filter="randombar(vertical)">
+                                      <p:cBhvr>
+                                        <p:cTn id="43" dur="500"/>
+                                        <p:tgtEl>
+                                          <p:spTgt spid="27"/>
+                                        </p:tgtEl>
+                                      </p:cBhvr>
+                                    </p:animEffect>
+                                  </p:childTnLst>
+                                </p:cTn>
+                              </p:par>
+                            </p:childTnLst>
+                          </p:cTn>
+                        </p:par>
+                        <p:par>
+                          <p:cTn id="44" fill="hold">
+                            <p:stCondLst>
+                              <p:cond delay="500"/>
+                            </p:stCondLst>
+                            <p:childTnLst>
+                              <p:par>
+                                <p:cTn id="45" presetID="14" presetClass="entr" presetSubtype="5" fill="hold" grpId="0" nodeType="afterEffect">
+                                  <p:stCondLst>
+                                    <p:cond delay="0"/>
+                                  </p:stCondLst>
+                                  <p:childTnLst>
+                                    <p:set>
+                                      <p:cBhvr>
+                                        <p:cTn id="46" dur="1" fill="hold">
+                                          <p:stCondLst>
+                                            <p:cond delay="0"/>
+                                          </p:stCondLst>
+                                        </p:cTn>
+                                        <p:tgtEl>
+                                          <p:spTgt spid="7"/>
+                                        </p:tgtEl>
+                                        <p:attrNameLst>
+                                          <p:attrName>style.visibility</p:attrName>
+                                        </p:attrNameLst>
+                                      </p:cBhvr>
+                                      <p:to>
+                                        <p:strVal val="visible"/>
+                                      </p:to>
+                                    </p:set>
+                                    <p:animEffect transition="in" filter="randombar(vertical)">
+                                      <p:cBhvr>
+                                        <p:cTn id="47" dur="500"/>
+                                        <p:tgtEl>
+                                          <p:spTgt spid="7"/>
+                                        </p:tgtEl>
+                                      </p:cBhvr>
+                                    </p:animEffect>
+                                  </p:childTnLst>
+                                </p:cTn>
+                              </p:par>
+                            </p:childTnLst>
+                          </p:cTn>
+                        </p:par>
+                      </p:childTnLst>
+                    </p:cTn>
+                  </p:par>
+                  <p:par>
+                    <p:cTn id="48" fill="hold">
+                      <p:stCondLst>
+                        <p:cond delay="indefinite"/>
+                      </p:stCondLst>
+                      <p:childTnLst>
+                        <p:par>
+                          <p:cTn id="49" fill="hold">
+                            <p:stCondLst>
+                              <p:cond delay="0"/>
+                            </p:stCondLst>
+                            <p:childTnLst>
+                              <p:par>
+                                <p:cTn id="50" presetID="14" presetClass="entr" presetSubtype="5" fill="hold" nodeType="clickEffect">
+                                  <p:stCondLst>
+                                    <p:cond delay="0"/>
+                                  </p:stCondLst>
+                                  <p:childTnLst>
+                                    <p:set>
+                                      <p:cBhvr>
+                                        <p:cTn id="51" dur="1" fill="hold">
+                                          <p:stCondLst>
+                                            <p:cond delay="0"/>
+                                          </p:stCondLst>
+                                        </p:cTn>
+                                        <p:tgtEl>
+                                          <p:spTgt spid="30"/>
+                                        </p:tgtEl>
+                                        <p:attrNameLst>
+                                          <p:attrName>style.visibility</p:attrName>
+                                        </p:attrNameLst>
+                                      </p:cBhvr>
+                                      <p:to>
+                                        <p:strVal val="visible"/>
+                                      </p:to>
+                                    </p:set>
+                                    <p:animEffect transition="in" filter="randombar(vertical)">
+                                      <p:cBhvr>
+                                        <p:cTn id="52" dur="500"/>
+                                        <p:tgtEl>
+                                          <p:spTgt spid="30"/>
+                                        </p:tgtEl>
+                                      </p:cBhvr>
+                                    </p:animEffect>
+                                  </p:childTnLst>
+                                </p:cTn>
+                              </p:par>
+                            </p:childTnLst>
+                          </p:cTn>
+                        </p:par>
+                        <p:par>
+                          <p:cTn id="53" fill="hold">
+                            <p:stCondLst>
+                              <p:cond delay="500"/>
+                            </p:stCondLst>
+                            <p:childTnLst>
+                              <p:par>
+                                <p:cTn id="54" presetID="14" presetClass="entr" presetSubtype="5" fill="hold" grpId="0" nodeType="afterEffect">
+                                  <p:stCondLst>
+                                    <p:cond delay="0"/>
+                                  </p:stCondLst>
+                                  <p:childTnLst>
+                                    <p:set>
+                                      <p:cBhvr>
+                                        <p:cTn id="55" dur="1" fill="hold">
+                                          <p:stCondLst>
+                                            <p:cond delay="0"/>
+                                          </p:stCondLst>
+                                        </p:cTn>
+                                        <p:tgtEl>
+                                          <p:spTgt spid="8"/>
+                                        </p:tgtEl>
+                                        <p:attrNameLst>
+                                          <p:attrName>style.visibility</p:attrName>
+                                        </p:attrNameLst>
+                                      </p:cBhvr>
+                                      <p:to>
+                                        <p:strVal val="visible"/>
+                                      </p:to>
+                                    </p:set>
+                                    <p:animEffect transition="in" filter="randombar(vertical)">
+                                      <p:cBhvr>
+                                        <p:cTn id="56" dur="500"/>
+                                        <p:tgtEl>
+                                          <p:spTgt spid="8"/>
+                                        </p:tgtEl>
+                                      </p:cBhvr>
+                                    </p:animEffect>
+                                  </p:childTnLst>
+                                </p:cTn>
+                              </p:par>
+                            </p:childTnLst>
+                          </p:cTn>
+                        </p:par>
+                      </p:childTnLst>
+                    </p:cTn>
+                  </p:par>
+                  <p:par>
+                    <p:cTn id="57" fill="hold">
+                      <p:stCondLst>
+                        <p:cond delay="indefinite"/>
+                      </p:stCondLst>
+                      <p:childTnLst>
+                        <p:par>
+                          <p:cTn id="58" fill="hold">
+                            <p:stCondLst>
+                              <p:cond delay="0"/>
+                            </p:stCondLst>
+                            <p:childTnLst>
+                              <p:par>
+                                <p:cTn id="59" presetID="14" presetClass="entr" presetSubtype="10" fill="hold" nodeType="clickEffect">
+                                  <p:stCondLst>
+                                    <p:cond delay="0"/>
+                                  </p:stCondLst>
+                                  <p:childTnLst>
+                                    <p:set>
+                                      <p:cBhvr>
+                                        <p:cTn id="60" dur="1" fill="hold">
+                                          <p:stCondLst>
+                                            <p:cond delay="0"/>
+                                          </p:stCondLst>
+                                        </p:cTn>
+                                        <p:tgtEl>
+                                          <p:spTgt spid="33"/>
+                                        </p:tgtEl>
+                                        <p:attrNameLst>
+                                          <p:attrName>style.visibility</p:attrName>
+                                        </p:attrNameLst>
+                                      </p:cBhvr>
+                                      <p:to>
+                                        <p:strVal val="visible"/>
+                                      </p:to>
+                                    </p:set>
+                                    <p:animEffect transition="in" filter="randombar(horizontal)">
+                                      <p:cBhvr>
+                                        <p:cTn id="61" dur="500"/>
+                                        <p:tgtEl>
+                                          <p:spTgt spid="33"/>
+                                        </p:tgtEl>
+                                      </p:cBhvr>
+                                    </p:animEffect>
+                                  </p:childTnLst>
+                                </p:cTn>
+                              </p:par>
+                            </p:childTnLst>
+                          </p:cTn>
+                        </p:par>
+                        <p:par>
+                          <p:cTn id="62" fill="hold">
+                            <p:stCondLst>
+                              <p:cond delay="500"/>
+                            </p:stCondLst>
+                            <p:childTnLst>
+                              <p:par>
+                                <p:cTn id="63" presetID="14" presetClass="entr" presetSubtype="10" fill="hold" grpId="0" nodeType="afterEffect">
+                                  <p:stCondLst>
+                                    <p:cond delay="0"/>
+                                  </p:stCondLst>
+                                  <p:childTnLst>
+                                    <p:set>
+                                      <p:cBhvr>
+                                        <p:cTn id="64" dur="1" fill="hold">
+                                          <p:stCondLst>
+                                            <p:cond delay="0"/>
+                                          </p:stCondLst>
+                                        </p:cTn>
+                                        <p:tgtEl>
+                                          <p:spTgt spid="9"/>
+                                        </p:tgtEl>
+                                        <p:attrNameLst>
+                                          <p:attrName>style.visibility</p:attrName>
+                                        </p:attrNameLst>
+                                      </p:cBhvr>
+                                      <p:to>
+                                        <p:strVal val="visible"/>
+                                      </p:to>
+                                    </p:set>
+                                    <p:animEffect transition="in" filter="randombar(horizontal)">
+                                      <p:cBhvr>
+                                        <p:cTn id="65" dur="500"/>
+                                        <p:tgtEl>
+                                          <p:spTgt spid="9"/>
+                                        </p:tgtEl>
+                                      </p:cBhvr>
+                                    </p:animEffect>
+                                  </p:childTnLst>
+                                </p:cTn>
+                              </p:par>
+                            </p:childTnLst>
+                          </p:cTn>
+                        </p:par>
+                      </p:childTnLst>
+                    </p:cTn>
+                  </p:par>
+                  <p:par>
+                    <p:cTn id="66" fill="hold">
+                      <p:stCondLst>
+                        <p:cond delay="indefinite"/>
+                      </p:stCondLst>
+                      <p:childTnLst>
+                        <p:par>
+                          <p:cTn id="67" fill="hold">
+                            <p:stCondLst>
+                              <p:cond delay="0"/>
+                            </p:stCondLst>
+                            <p:childTnLst>
+                              <p:par>
+                                <p:cTn id="68" presetID="14" presetClass="entr" presetSubtype="10" fill="hold" nodeType="clickEffect">
+                                  <p:stCondLst>
+                                    <p:cond delay="0"/>
+                                  </p:stCondLst>
+                                  <p:childTnLst>
+                                    <p:set>
+                                      <p:cBhvr>
+                                        <p:cTn id="69" dur="1" fill="hold">
+                                          <p:stCondLst>
+                                            <p:cond delay="0"/>
+                                          </p:stCondLst>
+                                        </p:cTn>
+                                        <p:tgtEl>
+                                          <p:spTgt spid="21"/>
+                                        </p:tgtEl>
+                                        <p:attrNameLst>
+                                          <p:attrName>style.visibility</p:attrName>
+                                        </p:attrNameLst>
+                                      </p:cBhvr>
+                                      <p:to>
+                                        <p:strVal val="visible"/>
+                                      </p:to>
+                                    </p:set>
+                                    <p:animEffect transition="in" filter="randombar(horizontal)">
+                                      <p:cBhvr>
+                                        <p:cTn id="70" dur="500"/>
+                                        <p:tgtEl>
+                                          <p:spTgt spid="21"/>
+                                        </p:tgtEl>
+                                      </p:cBhvr>
+                                    </p:animEffect>
+                                  </p:childTnLst>
+                                </p:cTn>
+                              </p:par>
+                            </p:childTnLst>
+                          </p:cTn>
+                        </p:par>
+                        <p:par>
+                          <p:cTn id="71" fill="hold">
+                            <p:stCondLst>
+                              <p:cond delay="500"/>
+                            </p:stCondLst>
+                            <p:childTnLst>
+                              <p:par>
+                                <p:cTn id="72" presetID="14" presetClass="entr" presetSubtype="10" fill="hold" grpId="0" nodeType="afterEffect">
+                                  <p:stCondLst>
+                                    <p:cond delay="0"/>
+                                  </p:stCondLst>
+                                  <p:childTnLst>
+                                    <p:set>
+                                      <p:cBhvr>
+                                        <p:cTn id="73" dur="1" fill="hold">
+                                          <p:stCondLst>
+                                            <p:cond delay="0"/>
+                                          </p:stCondLst>
+                                        </p:cTn>
+                                        <p:tgtEl>
+                                          <p:spTgt spid="10"/>
+                                        </p:tgtEl>
+                                        <p:attrNameLst>
+                                          <p:attrName>style.visibility</p:attrName>
+                                        </p:attrNameLst>
+                                      </p:cBhvr>
+                                      <p:to>
+                                        <p:strVal val="visible"/>
+                                      </p:to>
+                                    </p:set>
+                                    <p:animEffect transition="in" filter="randombar(horizontal)">
+                                      <p:cBhvr>
+                                        <p:cTn id="74" dur="500"/>
+                                        <p:tgtEl>
+                                          <p:spTgt spid="10"/>
+                                        </p:tgtEl>
+                                      </p:cBhvr>
+                                    </p:animEffect>
+                                  </p:childTnLst>
+                                </p:cTn>
+                              </p:par>
+                            </p:childTnLst>
+                          </p:cTn>
+                        </p:par>
+                      </p:childTnLst>
+                    </p:cTn>
+                  </p:par>
+                  <p:par>
+                    <p:cTn id="75" fill="hold">
+                      <p:stCondLst>
+                        <p:cond delay="indefinite"/>
+                      </p:stCondLst>
+                      <p:childTnLst>
+                        <p:par>
+                          <p:cTn id="76" fill="hold">
+                            <p:stCondLst>
+                              <p:cond delay="0"/>
+                            </p:stCondLst>
+                            <p:childTnLst>
+                              <p:par>
+                                <p:cTn id="77" presetID="14" presetClass="entr" presetSubtype="10" fill="hold" nodeType="clickEffect">
+                                  <p:stCondLst>
+                                    <p:cond delay="0"/>
+                                  </p:stCondLst>
+                                  <p:childTnLst>
+                                    <p:set>
+                                      <p:cBhvr>
+                                        <p:cTn id="78" dur="1" fill="hold">
+                                          <p:stCondLst>
+                                            <p:cond delay="0"/>
+                                          </p:stCondLst>
+                                        </p:cTn>
+                                        <p:tgtEl>
+                                          <p:spTgt spid="34"/>
+                                        </p:tgtEl>
+                                        <p:attrNameLst>
+                                          <p:attrName>style.visibility</p:attrName>
+                                        </p:attrNameLst>
+                                      </p:cBhvr>
+                                      <p:to>
+                                        <p:strVal val="visible"/>
+                                      </p:to>
+                                    </p:set>
+                                    <p:animEffect transition="in" filter="randombar(horizontal)">
+                                      <p:cBhvr>
+                                        <p:cTn id="79" dur="500"/>
+                                        <p:tgtEl>
+                                          <p:spTgt spid="34"/>
+                                        </p:tgtEl>
+                                      </p:cBhvr>
+                                    </p:animEffect>
+                                  </p:childTnLst>
+                                </p:cTn>
+                              </p:par>
+                            </p:childTnLst>
+                          </p:cTn>
+                        </p:par>
+                        <p:par>
+                          <p:cTn id="80" fill="hold">
+                            <p:stCondLst>
+                              <p:cond delay="500"/>
+                            </p:stCondLst>
+                            <p:childTnLst>
+                              <p:par>
+                                <p:cTn id="81" presetID="14" presetClass="entr" presetSubtype="10" fill="hold" grpId="0" nodeType="afterEffect">
+                                  <p:stCondLst>
+                                    <p:cond delay="0"/>
+                                  </p:stCondLst>
+                                  <p:childTnLst>
+                                    <p:set>
+                                      <p:cBhvr>
+                                        <p:cTn id="82" dur="1" fill="hold">
+                                          <p:stCondLst>
+                                            <p:cond delay="0"/>
+                                          </p:stCondLst>
+                                        </p:cTn>
+                                        <p:tgtEl>
+                                          <p:spTgt spid="11"/>
+                                        </p:tgtEl>
+                                        <p:attrNameLst>
+                                          <p:attrName>style.visibility</p:attrName>
+                                        </p:attrNameLst>
+                                      </p:cBhvr>
+                                      <p:to>
+                                        <p:strVal val="visible"/>
+                                      </p:to>
+                                    </p:set>
+                                    <p:animEffect transition="in" filter="randombar(horizontal)">
+                                      <p:cBhvr>
+                                        <p:cTn id="83" dur="500"/>
+                                        <p:tgtEl>
+                                          <p:spTgt spid="11"/>
+                                        </p:tgtEl>
+                                      </p:cBhvr>
+                                    </p:animEffect>
+                                  </p:childTnLst>
+                                </p:cTn>
+                              </p:par>
+                            </p:childTnLst>
+                          </p:cTn>
+                        </p:par>
+                      </p:childTnLst>
+                    </p:cTn>
+                  </p:par>
+                  <p:par>
+                    <p:cTn id="84" fill="hold">
+                      <p:stCondLst>
+                        <p:cond delay="indefinite"/>
+                      </p:stCondLst>
+                      <p:childTnLst>
+                        <p:par>
+                          <p:cTn id="85" fill="hold">
+                            <p:stCondLst>
+                              <p:cond delay="0"/>
+                            </p:stCondLst>
+                            <p:childTnLst>
+                              <p:par>
+                                <p:cTn id="86" presetID="14" presetClass="entr" presetSubtype="5" fill="hold" nodeType="clickEffect">
+                                  <p:stCondLst>
+                                    <p:cond delay="0"/>
+                                  </p:stCondLst>
+                                  <p:childTnLst>
+                                    <p:set>
+                                      <p:cBhvr>
+                                        <p:cTn id="87" dur="1" fill="hold">
+                                          <p:stCondLst>
+                                            <p:cond delay="0"/>
+                                          </p:stCondLst>
+                                        </p:cTn>
+                                        <p:tgtEl>
+                                          <p:spTgt spid="32"/>
+                                        </p:tgtEl>
+                                        <p:attrNameLst>
+                                          <p:attrName>style.visibility</p:attrName>
+                                        </p:attrNameLst>
+                                      </p:cBhvr>
+                                      <p:to>
+                                        <p:strVal val="visible"/>
+                                      </p:to>
+                                    </p:set>
+                                    <p:animEffect transition="in" filter="randombar(vertical)">
+                                      <p:cBhvr>
+                                        <p:cTn id="88" dur="500"/>
+                                        <p:tgtEl>
+                                          <p:spTgt spid="32"/>
+                                        </p:tgtEl>
+                                      </p:cBhvr>
+                                    </p:animEffect>
+                                  </p:childTnLst>
+                                </p:cTn>
+                              </p:par>
+                            </p:childTnLst>
+                          </p:cTn>
+                        </p:par>
+                        <p:par>
+                          <p:cTn id="89" fill="hold">
+                            <p:stCondLst>
+                              <p:cond delay="500"/>
+                            </p:stCondLst>
+                            <p:childTnLst>
+                              <p:par>
+                                <p:cTn id="90" presetID="14" presetClass="entr" presetSubtype="5" fill="hold" grpId="0" nodeType="afterEffect">
+                                  <p:stCondLst>
+                                    <p:cond delay="0"/>
+                                  </p:stCondLst>
+                                  <p:childTnLst>
+                                    <p:set>
+                                      <p:cBhvr>
+                                        <p:cTn id="91" dur="1" fill="hold">
+                                          <p:stCondLst>
+                                            <p:cond delay="0"/>
+                                          </p:stCondLst>
+                                        </p:cTn>
+                                        <p:tgtEl>
+                                          <p:spTgt spid="12"/>
+                                        </p:tgtEl>
+                                        <p:attrNameLst>
+                                          <p:attrName>style.visibility</p:attrName>
+                                        </p:attrNameLst>
+                                      </p:cBhvr>
+                                      <p:to>
+                                        <p:strVal val="visible"/>
+                                      </p:to>
+                                    </p:set>
+                                    <p:animEffect transition="in" filter="randombar(vertical)">
+                                      <p:cBhvr>
+                                        <p:cTn id="92" dur="500"/>
+                                        <p:tgtEl>
+                                          <p:spTgt spid="12"/>
+                                        </p:tgtEl>
+                                      </p:cBhvr>
+                                    </p:animEffect>
+                                  </p:childTnLst>
+                                </p:cTn>
+                              </p:par>
+                            </p:childTnLst>
+                          </p:cTn>
+                        </p:par>
+                      </p:childTnLst>
+                    </p:cTn>
+                  </p:par>
+                  <p:par>
+                    <p:cTn id="93" fill="hold">
+                      <p:stCondLst>
+                        <p:cond delay="indefinite"/>
+                      </p:stCondLst>
+                      <p:childTnLst>
+                        <p:par>
+                          <p:cTn id="94" fill="hold">
+                            <p:stCondLst>
+                              <p:cond delay="0"/>
+                            </p:stCondLst>
+                            <p:childTnLst>
+                              <p:par>
+                                <p:cTn id="95" presetID="14" presetClass="entr" presetSubtype="5" fill="hold" nodeType="clickEffect">
+                                  <p:stCondLst>
+                                    <p:cond delay="0"/>
+                                  </p:stCondLst>
+                                  <p:childTnLst>
+                                    <p:set>
+                                      <p:cBhvr>
+                                        <p:cTn id="96" dur="1" fill="hold">
+                                          <p:stCondLst>
+                                            <p:cond delay="0"/>
+                                          </p:stCondLst>
+                                        </p:cTn>
+                                        <p:tgtEl>
+                                          <p:spTgt spid="31"/>
+                                        </p:tgtEl>
+                                        <p:attrNameLst>
+                                          <p:attrName>style.visibility</p:attrName>
+                                        </p:attrNameLst>
+                                      </p:cBhvr>
+                                      <p:to>
+                                        <p:strVal val="visible"/>
+                                      </p:to>
+                                    </p:set>
+                                    <p:animEffect transition="in" filter="randombar(vertical)">
+                                      <p:cBhvr>
+                                        <p:cTn id="97" dur="500"/>
+                                        <p:tgtEl>
+                                          <p:spTgt spid="31"/>
+                                        </p:tgtEl>
+                                      </p:cBhvr>
+                                    </p:animEffect>
+                                  </p:childTnLst>
+                                </p:cTn>
+                              </p:par>
+                            </p:childTnLst>
+                          </p:cTn>
+                        </p:par>
+                        <p:par>
+                          <p:cTn id="98" fill="hold">
+                            <p:stCondLst>
+                              <p:cond delay="500"/>
+                            </p:stCondLst>
+                            <p:childTnLst>
+                              <p:par>
+                                <p:cTn id="99" presetID="14" presetClass="entr" presetSubtype="5" fill="hold" grpId="0" nodeType="afterEffect">
+                                  <p:stCondLst>
+                                    <p:cond delay="0"/>
+                                  </p:stCondLst>
+                                  <p:childTnLst>
+                                    <p:set>
+                                      <p:cBhvr>
+                                        <p:cTn id="100" dur="1" fill="hold">
+                                          <p:stCondLst>
+                                            <p:cond delay="0"/>
+                                          </p:stCondLst>
+                                        </p:cTn>
+                                        <p:tgtEl>
+                                          <p:spTgt spid="13"/>
+                                        </p:tgtEl>
+                                        <p:attrNameLst>
+                                          <p:attrName>style.visibility</p:attrName>
+                                        </p:attrNameLst>
+                                      </p:cBhvr>
+                                      <p:to>
+                                        <p:strVal val="visible"/>
+                                      </p:to>
+                                    </p:set>
+                                    <p:animEffect transition="in" filter="randombar(vertical)">
+                                      <p:cBhvr>
+                                        <p:cTn id="101" dur="500"/>
+                                        <p:tgtEl>
+                                          <p:spTgt spid="13"/>
+                                        </p:tgtEl>
+                                      </p:cBhvr>
+                                    </p:animEffect>
+                                  </p:childTnLst>
+                                </p:cTn>
+                              </p:par>
+                            </p:childTnLst>
+                          </p:cTn>
+                        </p:par>
+                      </p:childTnLst>
+                    </p:cTn>
+                  </p:par>
+                </p:childTnLst>
+              </p:cTn>
+              <p:prevCondLst>
+                <p:cond evt="onPrev" delay="0">
+                  <p:tgtEl>
+                    <p:sldTgt/>
+                  </p:tgtEl>
+                </p:cond>
+              </p:prevCondLst>
+              <p:nextCondLst>
+                <p:cond evt="onNext" delay="0">
+                  <p:tgtEl>
+                    <p:sldTgt/>
+                  </p:tgtEl>
+                </p:cond>
+              </p:nextCondLst>
+            </p:seq>
+          </p:childTnLst>
+        </p:cTn>
+      </p:par>
+    </p:tnLst>
+    <p:bldLst>
+      <p:bldP spid="2" grpId="0"/>
+      <p:bldP spid="4" grpId="0"/>
+      <p:bldP spid="5" grpId="0"/>
+      <p:bldP spid="7" grpId="0"/>
+      <p:bldP spid="8" grpId="0"/>
+      <p:bldP spid="9" grpId="0"/>
+      <p:bldP spid="10" grpId="0"/>
+      <p:bldP spid="11" grpId="0"/>
+      <p:bldP spid="12" grpId="0"/>
+      <p:bldP spid="13" grpId="0"/>
+      <p:bldP spid="29" grpId="1"/>
+      <p:bldP spid="29" grpId="2"/>
+    </p:bldLst>
+  </p:timing>
 </p:sld>
 </file>
 

</xml_diff>

<commit_message>
Added a new slide to indicate the difference between binding and assignment
</commit_message>
<xml_diff>
--- a/F#Presentation.pptx
+++ b/F#Presentation.pptx
@@ -7,6 +7,7 @@
   <p:sldIdLst>
     <p:sldId id="256" r:id="rId2"/>
     <p:sldId id="257" r:id="rId3"/>
+    <p:sldId id="258" r:id="rId4"/>
   </p:sldIdLst>
   <p:sldSz cx="12192000" cy="6858000"/>
   <p:notesSz cx="6858000" cy="9144000"/>
@@ -244,7 +245,7 @@
           <a:p>
             <a:fld id="{BCAC8651-F919-45BD-B9AA-B06CF5EE0DFC}" type="datetimeFigureOut">
               <a:rPr lang="en-GB" smtClean="0"/>
-              <a:t>03/08/2015</a:t>
+              <a:t>09/08/2015</a:t>
             </a:fld>
             <a:endParaRPr lang="en-GB"/>
           </a:p>
@@ -414,7 +415,7 @@
           <a:p>
             <a:fld id="{BCAC8651-F919-45BD-B9AA-B06CF5EE0DFC}" type="datetimeFigureOut">
               <a:rPr lang="en-GB" smtClean="0"/>
-              <a:t>03/08/2015</a:t>
+              <a:t>09/08/2015</a:t>
             </a:fld>
             <a:endParaRPr lang="en-GB"/>
           </a:p>
@@ -594,7 +595,7 @@
           <a:p>
             <a:fld id="{BCAC8651-F919-45BD-B9AA-B06CF5EE0DFC}" type="datetimeFigureOut">
               <a:rPr lang="en-GB" smtClean="0"/>
-              <a:t>03/08/2015</a:t>
+              <a:t>09/08/2015</a:t>
             </a:fld>
             <a:endParaRPr lang="en-GB"/>
           </a:p>
@@ -764,7 +765,7 @@
           <a:p>
             <a:fld id="{BCAC8651-F919-45BD-B9AA-B06CF5EE0DFC}" type="datetimeFigureOut">
               <a:rPr lang="en-GB" smtClean="0"/>
-              <a:t>03/08/2015</a:t>
+              <a:t>09/08/2015</a:t>
             </a:fld>
             <a:endParaRPr lang="en-GB"/>
           </a:p>
@@ -1010,7 +1011,7 @@
           <a:p>
             <a:fld id="{BCAC8651-F919-45BD-B9AA-B06CF5EE0DFC}" type="datetimeFigureOut">
               <a:rPr lang="en-GB" smtClean="0"/>
-              <a:t>03/08/2015</a:t>
+              <a:t>09/08/2015</a:t>
             </a:fld>
             <a:endParaRPr lang="en-GB"/>
           </a:p>
@@ -1242,7 +1243,7 @@
           <a:p>
             <a:fld id="{BCAC8651-F919-45BD-B9AA-B06CF5EE0DFC}" type="datetimeFigureOut">
               <a:rPr lang="en-GB" smtClean="0"/>
-              <a:t>03/08/2015</a:t>
+              <a:t>09/08/2015</a:t>
             </a:fld>
             <a:endParaRPr lang="en-GB"/>
           </a:p>
@@ -1609,7 +1610,7 @@
           <a:p>
             <a:fld id="{BCAC8651-F919-45BD-B9AA-B06CF5EE0DFC}" type="datetimeFigureOut">
               <a:rPr lang="en-GB" smtClean="0"/>
-              <a:t>03/08/2015</a:t>
+              <a:t>09/08/2015</a:t>
             </a:fld>
             <a:endParaRPr lang="en-GB"/>
           </a:p>
@@ -1727,7 +1728,7 @@
           <a:p>
             <a:fld id="{BCAC8651-F919-45BD-B9AA-B06CF5EE0DFC}" type="datetimeFigureOut">
               <a:rPr lang="en-GB" smtClean="0"/>
-              <a:t>03/08/2015</a:t>
+              <a:t>09/08/2015</a:t>
             </a:fld>
             <a:endParaRPr lang="en-GB"/>
           </a:p>
@@ -1822,7 +1823,7 @@
           <a:p>
             <a:fld id="{BCAC8651-F919-45BD-B9AA-B06CF5EE0DFC}" type="datetimeFigureOut">
               <a:rPr lang="en-GB" smtClean="0"/>
-              <a:t>03/08/2015</a:t>
+              <a:t>09/08/2015</a:t>
             </a:fld>
             <a:endParaRPr lang="en-GB"/>
           </a:p>
@@ -2099,7 +2100,7 @@
           <a:p>
             <a:fld id="{BCAC8651-F919-45BD-B9AA-B06CF5EE0DFC}" type="datetimeFigureOut">
               <a:rPr lang="en-GB" smtClean="0"/>
-              <a:t>03/08/2015</a:t>
+              <a:t>09/08/2015</a:t>
             </a:fld>
             <a:endParaRPr lang="en-GB"/>
           </a:p>
@@ -2352,7 +2353,7 @@
           <a:p>
             <a:fld id="{BCAC8651-F919-45BD-B9AA-B06CF5EE0DFC}" type="datetimeFigureOut">
               <a:rPr lang="en-GB" smtClean="0"/>
-              <a:t>03/08/2015</a:t>
+              <a:t>09/08/2015</a:t>
             </a:fld>
             <a:endParaRPr lang="en-GB"/>
           </a:p>
@@ -2565,7 +2566,7 @@
           <a:p>
             <a:fld id="{BCAC8651-F919-45BD-B9AA-B06CF5EE0DFC}" type="datetimeFigureOut">
               <a:rPr lang="en-GB" smtClean="0"/>
-              <a:t>03/08/2015</a:t>
+              <a:t>09/08/2015</a:t>
             </a:fld>
             <a:endParaRPr lang="en-GB"/>
           </a:p>
@@ -6664,6 +6665,681 @@
 </p:sld>
 </file>
 
+<file path=ppt/slides/slide3.xml><?xml version="1.0" encoding="utf-8"?>
+<p:sld xmlns:a="http://schemas.openxmlformats.org/drawingml/2006/main" xmlns:r="http://schemas.openxmlformats.org/officeDocument/2006/relationships" xmlns:p="http://schemas.openxmlformats.org/presentationml/2006/main">
+  <p:cSld>
+    <p:spTree>
+      <p:nvGrpSpPr>
+        <p:cNvPr id="1" name=""/>
+        <p:cNvGrpSpPr/>
+        <p:nvPr/>
+      </p:nvGrpSpPr>
+      <p:grpSpPr>
+        <a:xfrm>
+          <a:off x="0" y="0"/>
+          <a:ext cx="0" cy="0"/>
+          <a:chOff x="0" y="0"/>
+          <a:chExt cx="0" cy="0"/>
+        </a:xfrm>
+      </p:grpSpPr>
+      <p:sp>
+        <p:nvSpPr>
+          <p:cNvPr id="3" name="Rectangle 2"/>
+          <p:cNvSpPr/>
+          <p:nvPr/>
+        </p:nvSpPr>
+        <p:spPr>
+          <a:xfrm>
+            <a:off x="1784199" y="2967335"/>
+            <a:ext cx="2356735" cy="923330"/>
+          </a:xfrm>
+          <a:prstGeom prst="rect">
+            <a:avLst/>
+          </a:prstGeom>
+          <a:noFill/>
+        </p:spPr>
+        <p:txBody>
+          <a:bodyPr wrap="none" lIns="91440" tIns="45720" rIns="91440" bIns="45720">
+            <a:spAutoFit/>
+          </a:bodyPr>
+          <a:lstStyle/>
+          <a:p>
+            <a:pPr algn="ctr"/>
+            <a:r>
+              <a:rPr lang="en-US" sz="5400" b="1" dirty="0" smtClean="0">
+                <a:ln w="22225">
+                  <a:solidFill>
+                    <a:schemeClr val="accent2"/>
+                  </a:solidFill>
+                  <a:prstDash val="solid"/>
+                </a:ln>
+                <a:solidFill>
+                  <a:schemeClr val="accent2">
+                    <a:lumMod val="40000"/>
+                    <a:lumOff val="60000"/>
+                  </a:schemeClr>
+                </a:solidFill>
+              </a:rPr>
+              <a:t>Binding</a:t>
+            </a:r>
+            <a:endParaRPr lang="en-US" sz="5400" b="1" cap="none" spc="0" dirty="0">
+              <a:ln w="13462">
+                <a:solidFill>
+                  <a:schemeClr val="bg1"/>
+                </a:solidFill>
+                <a:prstDash val="solid"/>
+              </a:ln>
+              <a:solidFill>
+                <a:schemeClr val="tx1">
+                  <a:lumMod val="85000"/>
+                  <a:lumOff val="15000"/>
+                </a:schemeClr>
+              </a:solidFill>
+              <a:effectLst>
+                <a:outerShdw dist="38100" dir="2700000" algn="bl" rotWithShape="0">
+                  <a:schemeClr val="accent5"/>
+                </a:outerShdw>
+              </a:effectLst>
+            </a:endParaRPr>
+          </a:p>
+        </p:txBody>
+      </p:sp>
+      <p:sp>
+        <p:nvSpPr>
+          <p:cNvPr id="25" name="Rectangle 24"/>
+          <p:cNvSpPr/>
+          <p:nvPr/>
+        </p:nvSpPr>
+        <p:spPr>
+          <a:xfrm>
+            <a:off x="5125221" y="2967335"/>
+            <a:ext cx="755335" cy="923330"/>
+          </a:xfrm>
+          <a:prstGeom prst="rect">
+            <a:avLst/>
+          </a:prstGeom>
+          <a:noFill/>
+        </p:spPr>
+        <p:txBody>
+          <a:bodyPr wrap="none" lIns="91440" tIns="45720" rIns="91440" bIns="45720">
+            <a:spAutoFit/>
+          </a:bodyPr>
+          <a:lstStyle/>
+          <a:p>
+            <a:pPr algn="ctr"/>
+            <a:r>
+              <a:rPr lang="en-US" sz="5400" b="1" dirty="0" smtClean="0">
+                <a:ln w="22225">
+                  <a:solidFill>
+                    <a:srgbClr val="FF0000"/>
+                  </a:solidFill>
+                  <a:prstDash val="solid"/>
+                </a:ln>
+                <a:solidFill>
+                  <a:schemeClr val="accent2">
+                    <a:lumMod val="40000"/>
+                    <a:lumOff val="60000"/>
+                  </a:schemeClr>
+                </a:solidFill>
+              </a:rPr>
+              <a:t>!=</a:t>
+            </a:r>
+            <a:endParaRPr lang="en-US" sz="5400" b="1" cap="none" spc="0" dirty="0">
+              <a:ln w="22225">
+                <a:solidFill>
+                  <a:srgbClr val="FF0000"/>
+                </a:solidFill>
+                <a:prstDash val="solid"/>
+              </a:ln>
+              <a:solidFill>
+                <a:schemeClr val="tx1">
+                  <a:lumMod val="85000"/>
+                  <a:lumOff val="15000"/>
+                </a:schemeClr>
+              </a:solidFill>
+              <a:effectLst>
+                <a:outerShdw dist="38100" dir="2700000" algn="bl" rotWithShape="0">
+                  <a:schemeClr val="accent5"/>
+                </a:outerShdw>
+              </a:effectLst>
+            </a:endParaRPr>
+          </a:p>
+        </p:txBody>
+      </p:sp>
+      <p:sp>
+        <p:nvSpPr>
+          <p:cNvPr id="26" name="Rectangle 25"/>
+          <p:cNvSpPr/>
+          <p:nvPr/>
+        </p:nvSpPr>
+        <p:spPr>
+          <a:xfrm>
+            <a:off x="6864843" y="2967335"/>
+            <a:ext cx="3542958" cy="923330"/>
+          </a:xfrm>
+          <a:prstGeom prst="rect">
+            <a:avLst/>
+          </a:prstGeom>
+          <a:noFill/>
+        </p:spPr>
+        <p:txBody>
+          <a:bodyPr wrap="none" lIns="91440" tIns="45720" rIns="91440" bIns="45720">
+            <a:spAutoFit/>
+          </a:bodyPr>
+          <a:lstStyle/>
+          <a:p>
+            <a:pPr algn="ctr"/>
+            <a:r>
+              <a:rPr lang="en-US" sz="5400" b="1" dirty="0" smtClean="0">
+                <a:ln w="22225">
+                  <a:solidFill>
+                    <a:schemeClr val="accent2"/>
+                  </a:solidFill>
+                  <a:prstDash val="solid"/>
+                </a:ln>
+                <a:solidFill>
+                  <a:schemeClr val="accent2">
+                    <a:lumMod val="40000"/>
+                    <a:lumOff val="60000"/>
+                  </a:schemeClr>
+                </a:solidFill>
+              </a:rPr>
+              <a:t>Assignment</a:t>
+            </a:r>
+            <a:endParaRPr lang="en-US" sz="5400" b="1" cap="none" spc="0" dirty="0">
+              <a:ln w="13462">
+                <a:solidFill>
+                  <a:schemeClr val="bg1"/>
+                </a:solidFill>
+                <a:prstDash val="solid"/>
+              </a:ln>
+              <a:solidFill>
+                <a:schemeClr val="tx1">
+                  <a:lumMod val="85000"/>
+                  <a:lumOff val="15000"/>
+                </a:schemeClr>
+              </a:solidFill>
+              <a:effectLst>
+                <a:outerShdw dist="38100" dir="2700000" algn="bl" rotWithShape="0">
+                  <a:schemeClr val="accent5"/>
+                </a:outerShdw>
+              </a:effectLst>
+            </a:endParaRPr>
+          </a:p>
+        </p:txBody>
+      </p:sp>
+      <p:sp>
+        <p:nvSpPr>
+          <p:cNvPr id="17" name="Rectangle 16"/>
+          <p:cNvSpPr/>
+          <p:nvPr/>
+        </p:nvSpPr>
+        <p:spPr>
+          <a:xfrm>
+            <a:off x="3988595" y="421359"/>
+            <a:ext cx="3028586" cy="923330"/>
+          </a:xfrm>
+          <a:prstGeom prst="rect">
+            <a:avLst/>
+          </a:prstGeom>
+          <a:noFill/>
+        </p:spPr>
+        <p:txBody>
+          <a:bodyPr wrap="none" lIns="91440" tIns="45720" rIns="91440" bIns="45720">
+            <a:spAutoFit/>
+          </a:bodyPr>
+          <a:lstStyle/>
+          <a:p>
+            <a:pPr algn="ctr"/>
+            <a:r>
+              <a:rPr lang="en-US" sz="5400" dirty="0" smtClean="0">
+                <a:ln w="0"/>
+                <a:solidFill>
+                  <a:srgbClr val="FF0000"/>
+                </a:solidFill>
+                <a:effectLst>
+                  <a:outerShdw blurRad="38100" dist="19050" dir="2700000" algn="tl" rotWithShape="0">
+                    <a:schemeClr val="dk1">
+                      <a:alpha val="40000"/>
+                    </a:schemeClr>
+                  </a:outerShdw>
+                </a:effectLst>
+              </a:rPr>
+              <a:t>OOP</a:t>
+            </a:r>
+            <a:r>
+              <a:rPr lang="en-US" sz="5400" dirty="0" smtClean="0">
+                <a:ln w="0"/>
+                <a:effectLst>
+                  <a:outerShdw blurRad="38100" dist="19050" dir="2700000" algn="tl" rotWithShape="0">
+                    <a:schemeClr val="dk1">
+                      <a:alpha val="40000"/>
+                    </a:schemeClr>
+                  </a:outerShdw>
+                </a:effectLst>
+              </a:rPr>
+              <a:t> </a:t>
+            </a:r>
+            <a:r>
+              <a:rPr lang="en-US" sz="5400" dirty="0" smtClean="0">
+                <a:ln w="0"/>
+                <a:solidFill>
+                  <a:srgbClr val="FF0000"/>
+                </a:solidFill>
+                <a:effectLst>
+                  <a:outerShdw blurRad="38100" dist="19050" dir="2700000" algn="tl" rotWithShape="0">
+                    <a:schemeClr val="dk1">
+                      <a:alpha val="40000"/>
+                    </a:schemeClr>
+                  </a:outerShdw>
+                </a:effectLst>
+              </a:rPr>
+              <a:t>vs FP</a:t>
+            </a:r>
+            <a:endParaRPr lang="en-US" sz="5400" b="0" cap="none" spc="0" dirty="0">
+              <a:ln w="0"/>
+              <a:solidFill>
+                <a:srgbClr val="FF0000"/>
+              </a:solidFill>
+              <a:effectLst>
+                <a:outerShdw blurRad="38100" dist="19050" dir="2700000" algn="tl" rotWithShape="0">
+                  <a:schemeClr val="dk1">
+                    <a:alpha val="40000"/>
+                  </a:schemeClr>
+                </a:outerShdw>
+              </a:effectLst>
+            </a:endParaRPr>
+          </a:p>
+        </p:txBody>
+      </p:sp>
+      <p:pic>
+        <p:nvPicPr>
+          <p:cNvPr id="35" name="Picture 34"/>
+          <p:cNvPicPr>
+            <a:picLocks noChangeAspect="1"/>
+          </p:cNvPicPr>
+          <p:nvPr/>
+        </p:nvPicPr>
+        <p:blipFill>
+          <a:blip r:embed="rId2" cstate="print">
+            <a:extLst>
+              <a:ext uri="{28A0092B-C50C-407E-A947-70E740481C1C}">
+                <a14:useLocalDpi xmlns:a14="http://schemas.microsoft.com/office/drawing/2010/main" val="0"/>
+              </a:ext>
+            </a:extLst>
+          </a:blip>
+          <a:stretch>
+            <a:fillRect/>
+          </a:stretch>
+        </p:blipFill>
+        <p:spPr>
+          <a:xfrm>
+            <a:off x="10407801" y="5647782"/>
+            <a:ext cx="2509473" cy="1317778"/>
+          </a:xfrm>
+          <a:prstGeom prst="rect">
+            <a:avLst/>
+          </a:prstGeom>
+        </p:spPr>
+      </p:pic>
+    </p:spTree>
+    <p:extLst>
+      <p:ext uri="{BB962C8B-B14F-4D97-AF65-F5344CB8AC3E}">
+        <p14:creationId xmlns:p14="http://schemas.microsoft.com/office/powerpoint/2010/main" val="4049053967"/>
+      </p:ext>
+    </p:extLst>
+  </p:cSld>
+  <p:clrMapOvr>
+    <a:masterClrMapping/>
+  </p:clrMapOvr>
+  <p:timing>
+    <p:tnLst>
+      <p:par>
+        <p:cTn id="1" dur="indefinite" restart="never" nodeType="tmRoot">
+          <p:childTnLst>
+            <p:seq concurrent="1" nextAc="seek">
+              <p:cTn id="2" dur="indefinite" nodeType="mainSeq">
+                <p:childTnLst>
+                  <p:par>
+                    <p:cTn id="3" fill="hold">
+                      <p:stCondLst>
+                        <p:cond delay="indefinite"/>
+                      </p:stCondLst>
+                      <p:childTnLst>
+                        <p:par>
+                          <p:cTn id="4" fill="hold">
+                            <p:stCondLst>
+                              <p:cond delay="0"/>
+                            </p:stCondLst>
+                            <p:childTnLst>
+                              <p:par>
+                                <p:cTn id="5" presetID="2" presetClass="entr" presetSubtype="8" fill="hold" grpId="0" nodeType="clickEffect">
+                                  <p:stCondLst>
+                                    <p:cond delay="0"/>
+                                  </p:stCondLst>
+                                  <p:childTnLst>
+                                    <p:set>
+                                      <p:cBhvr>
+                                        <p:cTn id="6" dur="1" fill="hold">
+                                          <p:stCondLst>
+                                            <p:cond delay="0"/>
+                                          </p:stCondLst>
+                                        </p:cTn>
+                                        <p:tgtEl>
+                                          <p:spTgt spid="3"/>
+                                        </p:tgtEl>
+                                        <p:attrNameLst>
+                                          <p:attrName>style.visibility</p:attrName>
+                                        </p:attrNameLst>
+                                      </p:cBhvr>
+                                      <p:to>
+                                        <p:strVal val="visible"/>
+                                      </p:to>
+                                    </p:set>
+                                    <p:anim calcmode="lin" valueType="num">
+                                      <p:cBhvr additive="base">
+                                        <p:cTn id="7" dur="500" fill="hold"/>
+                                        <p:tgtEl>
+                                          <p:spTgt spid="3"/>
+                                        </p:tgtEl>
+                                        <p:attrNameLst>
+                                          <p:attrName>ppt_x</p:attrName>
+                                        </p:attrNameLst>
+                                      </p:cBhvr>
+                                      <p:tavLst>
+                                        <p:tav tm="0">
+                                          <p:val>
+                                            <p:strVal val="0-#ppt_w/2"/>
+                                          </p:val>
+                                        </p:tav>
+                                        <p:tav tm="100000">
+                                          <p:val>
+                                            <p:strVal val="#ppt_x"/>
+                                          </p:val>
+                                        </p:tav>
+                                      </p:tavLst>
+                                    </p:anim>
+                                    <p:anim calcmode="lin" valueType="num">
+                                      <p:cBhvr additive="base">
+                                        <p:cTn id="8" dur="500" fill="hold"/>
+                                        <p:tgtEl>
+                                          <p:spTgt spid="3"/>
+                                        </p:tgtEl>
+                                        <p:attrNameLst>
+                                          <p:attrName>ppt_y</p:attrName>
+                                        </p:attrNameLst>
+                                      </p:cBhvr>
+                                      <p:tavLst>
+                                        <p:tav tm="0">
+                                          <p:val>
+                                            <p:strVal val="#ppt_y"/>
+                                          </p:val>
+                                        </p:tav>
+                                        <p:tav tm="100000">
+                                          <p:val>
+                                            <p:strVal val="#ppt_y"/>
+                                          </p:val>
+                                        </p:tav>
+                                      </p:tavLst>
+                                    </p:anim>
+                                  </p:childTnLst>
+                                </p:cTn>
+                              </p:par>
+                            </p:childTnLst>
+                          </p:cTn>
+                        </p:par>
+                      </p:childTnLst>
+                    </p:cTn>
+                  </p:par>
+                  <p:par>
+                    <p:cTn id="9" fill="hold">
+                      <p:stCondLst>
+                        <p:cond delay="indefinite"/>
+                      </p:stCondLst>
+                      <p:childTnLst>
+                        <p:par>
+                          <p:cTn id="10" fill="hold">
+                            <p:stCondLst>
+                              <p:cond delay="0"/>
+                            </p:stCondLst>
+                            <p:childTnLst>
+                              <p:par>
+                                <p:cTn id="11" presetID="2" presetClass="entr" presetSubtype="4" fill="hold" grpId="0" nodeType="clickEffect">
+                                  <p:stCondLst>
+                                    <p:cond delay="0"/>
+                                  </p:stCondLst>
+                                  <p:childTnLst>
+                                    <p:set>
+                                      <p:cBhvr>
+                                        <p:cTn id="12" dur="1" fill="hold">
+                                          <p:stCondLst>
+                                            <p:cond delay="0"/>
+                                          </p:stCondLst>
+                                        </p:cTn>
+                                        <p:tgtEl>
+                                          <p:spTgt spid="25"/>
+                                        </p:tgtEl>
+                                        <p:attrNameLst>
+                                          <p:attrName>style.visibility</p:attrName>
+                                        </p:attrNameLst>
+                                      </p:cBhvr>
+                                      <p:to>
+                                        <p:strVal val="visible"/>
+                                      </p:to>
+                                    </p:set>
+                                    <p:anim calcmode="lin" valueType="num">
+                                      <p:cBhvr additive="base">
+                                        <p:cTn id="13" dur="500" fill="hold"/>
+                                        <p:tgtEl>
+                                          <p:spTgt spid="25"/>
+                                        </p:tgtEl>
+                                        <p:attrNameLst>
+                                          <p:attrName>ppt_x</p:attrName>
+                                        </p:attrNameLst>
+                                      </p:cBhvr>
+                                      <p:tavLst>
+                                        <p:tav tm="0">
+                                          <p:val>
+                                            <p:strVal val="#ppt_x"/>
+                                          </p:val>
+                                        </p:tav>
+                                        <p:tav tm="100000">
+                                          <p:val>
+                                            <p:strVal val="#ppt_x"/>
+                                          </p:val>
+                                        </p:tav>
+                                      </p:tavLst>
+                                    </p:anim>
+                                    <p:anim calcmode="lin" valueType="num">
+                                      <p:cBhvr additive="base">
+                                        <p:cTn id="14" dur="500" fill="hold"/>
+                                        <p:tgtEl>
+                                          <p:spTgt spid="25"/>
+                                        </p:tgtEl>
+                                        <p:attrNameLst>
+                                          <p:attrName>ppt_y</p:attrName>
+                                        </p:attrNameLst>
+                                      </p:cBhvr>
+                                      <p:tavLst>
+                                        <p:tav tm="0">
+                                          <p:val>
+                                            <p:strVal val="1+#ppt_h/2"/>
+                                          </p:val>
+                                        </p:tav>
+                                        <p:tav tm="100000">
+                                          <p:val>
+                                            <p:strVal val="#ppt_y"/>
+                                          </p:val>
+                                        </p:tav>
+                                      </p:tavLst>
+                                    </p:anim>
+                                  </p:childTnLst>
+                                </p:cTn>
+                              </p:par>
+                            </p:childTnLst>
+                          </p:cTn>
+                        </p:par>
+                      </p:childTnLst>
+                    </p:cTn>
+                  </p:par>
+                  <p:par>
+                    <p:cTn id="15" fill="hold">
+                      <p:stCondLst>
+                        <p:cond delay="indefinite"/>
+                      </p:stCondLst>
+                      <p:childTnLst>
+                        <p:par>
+                          <p:cTn id="16" fill="hold">
+                            <p:stCondLst>
+                              <p:cond delay="0"/>
+                            </p:stCondLst>
+                            <p:childTnLst>
+                              <p:par>
+                                <p:cTn id="17" presetID="2" presetClass="entr" presetSubtype="2" fill="hold" grpId="0" nodeType="clickEffect">
+                                  <p:stCondLst>
+                                    <p:cond delay="0"/>
+                                  </p:stCondLst>
+                                  <p:childTnLst>
+                                    <p:set>
+                                      <p:cBhvr>
+                                        <p:cTn id="18" dur="1" fill="hold">
+                                          <p:stCondLst>
+                                            <p:cond delay="0"/>
+                                          </p:stCondLst>
+                                        </p:cTn>
+                                        <p:tgtEl>
+                                          <p:spTgt spid="26"/>
+                                        </p:tgtEl>
+                                        <p:attrNameLst>
+                                          <p:attrName>style.visibility</p:attrName>
+                                        </p:attrNameLst>
+                                      </p:cBhvr>
+                                      <p:to>
+                                        <p:strVal val="visible"/>
+                                      </p:to>
+                                    </p:set>
+                                    <p:anim calcmode="lin" valueType="num">
+                                      <p:cBhvr additive="base">
+                                        <p:cTn id="19" dur="500" fill="hold"/>
+                                        <p:tgtEl>
+                                          <p:spTgt spid="26"/>
+                                        </p:tgtEl>
+                                        <p:attrNameLst>
+                                          <p:attrName>ppt_x</p:attrName>
+                                        </p:attrNameLst>
+                                      </p:cBhvr>
+                                      <p:tavLst>
+                                        <p:tav tm="0">
+                                          <p:val>
+                                            <p:strVal val="1+#ppt_w/2"/>
+                                          </p:val>
+                                        </p:tav>
+                                        <p:tav tm="100000">
+                                          <p:val>
+                                            <p:strVal val="#ppt_x"/>
+                                          </p:val>
+                                        </p:tav>
+                                      </p:tavLst>
+                                    </p:anim>
+                                    <p:anim calcmode="lin" valueType="num">
+                                      <p:cBhvr additive="base">
+                                        <p:cTn id="20" dur="500" fill="hold"/>
+                                        <p:tgtEl>
+                                          <p:spTgt spid="26"/>
+                                        </p:tgtEl>
+                                        <p:attrNameLst>
+                                          <p:attrName>ppt_y</p:attrName>
+                                        </p:attrNameLst>
+                                      </p:cBhvr>
+                                      <p:tavLst>
+                                        <p:tav tm="0">
+                                          <p:val>
+                                            <p:strVal val="#ppt_y"/>
+                                          </p:val>
+                                        </p:tav>
+                                        <p:tav tm="100000">
+                                          <p:val>
+                                            <p:strVal val="#ppt_y"/>
+                                          </p:val>
+                                        </p:tav>
+                                      </p:tavLst>
+                                    </p:anim>
+                                  </p:childTnLst>
+                                </p:cTn>
+                              </p:par>
+                            </p:childTnLst>
+                          </p:cTn>
+                        </p:par>
+                      </p:childTnLst>
+                    </p:cTn>
+                  </p:par>
+                  <p:par>
+                    <p:cTn id="21" fill="hold">
+                      <p:stCondLst>
+                        <p:cond delay="indefinite"/>
+                      </p:stCondLst>
+                      <p:childTnLst>
+                        <p:par>
+                          <p:cTn id="22" fill="hold">
+                            <p:stCondLst>
+                              <p:cond delay="0"/>
+                            </p:stCondLst>
+                            <p:childTnLst>
+                              <p:par>
+                                <p:cTn id="23" presetID="6" presetClass="emph" presetSubtype="0" fill="hold" grpId="1" nodeType="clickEffect">
+                                  <p:stCondLst>
+                                    <p:cond delay="0"/>
+                                  </p:stCondLst>
+                                  <p:childTnLst>
+                                    <p:animScale>
+                                      <p:cBhvr>
+                                        <p:cTn id="24" dur="1000" fill="hold"/>
+                                        <p:tgtEl>
+                                          <p:spTgt spid="25"/>
+                                        </p:tgtEl>
+                                      </p:cBhvr>
+                                      <p:by x="150000" y="150000"/>
+                                    </p:animScale>
+                                  </p:childTnLst>
+                                </p:cTn>
+                              </p:par>
+                            </p:childTnLst>
+                          </p:cTn>
+                        </p:par>
+                      </p:childTnLst>
+                    </p:cTn>
+                  </p:par>
+                </p:childTnLst>
+              </p:cTn>
+              <p:prevCondLst>
+                <p:cond evt="onPrev" delay="0">
+                  <p:tgtEl>
+                    <p:sldTgt/>
+                  </p:tgtEl>
+                </p:cond>
+              </p:prevCondLst>
+              <p:nextCondLst>
+                <p:cond evt="onNext" delay="0">
+                  <p:tgtEl>
+                    <p:sldTgt/>
+                  </p:tgtEl>
+                </p:cond>
+              </p:nextCondLst>
+            </p:seq>
+          </p:childTnLst>
+        </p:cTn>
+      </p:par>
+    </p:tnLst>
+    <p:bldLst>
+      <p:bldP spid="3" grpId="0"/>
+      <p:bldP spid="25" grpId="0"/>
+      <p:bldP spid="25" grpId="1"/>
+      <p:bldP spid="26" grpId="0"/>
+    </p:bldLst>
+  </p:timing>
+</p:sld>
+</file>
+
 <file path=ppt/theme/theme1.xml><?xml version="1.0" encoding="utf-8"?>
 <a:theme xmlns:a="http://schemas.openxmlformats.org/drawingml/2006/main" name="Office Theme">
   <a:themeElements>

</xml_diff>